<commit_message>
[Require.js] Finalize the require.js presentation with samples
</commit_message>
<xml_diff>
--- a/require.js/require.js.pptx
+++ b/require.js/require.js.pptx
@@ -5,7 +5,7 @@
     <p:sldMasterId id="2147483648" r:id="rId1"/>
   </p:sldMasterIdLst>
   <p:notesMasterIdLst>
-    <p:notesMasterId r:id="rId9"/>
+    <p:notesMasterId r:id="rId7"/>
   </p:notesMasterIdLst>
   <p:sldIdLst>
     <p:sldId id="256" r:id="rId2"/>
@@ -13,8 +13,6 @@
     <p:sldId id="258" r:id="rId4"/>
     <p:sldId id="259" r:id="rId5"/>
     <p:sldId id="260" r:id="rId6"/>
-    <p:sldId id="261" r:id="rId7"/>
-    <p:sldId id="262" r:id="rId8"/>
   </p:sldIdLst>
   <p:sldSz cx="12192000" cy="6858000"/>
   <p:notesSz cx="6858000" cy="9144000"/>
@@ -123,11 +121,12 @@
             <p14:sldId id="258"/>
             <p14:sldId id="259"/>
             <p14:sldId id="260"/>
-            <p14:sldId id="261"/>
-            <p14:sldId id="262"/>
           </p14:sldIdLst>
         </p14:section>
       </p14:sectionLst>
+    </p:ext>
+    <p:ext uri="{EFAFB233-063F-42B5-8137-9DF3F51BA10A}">
+      <p15:sldGuideLst xmlns:p15="http://schemas.microsoft.com/office/powerpoint/2012/main"/>
     </p:ext>
   </p:extLst>
 </p:presentation>
@@ -215,7 +214,7 @@
           <a:p>
             <a:fld id="{C5154B15-60D3-4535-B029-4D100D89B8DD}" type="datetimeFigureOut">
               <a:rPr lang="fr-FR" smtClean="0"/>
-              <a:t>16/10/2013</a:t>
+              <a:t>21/10/2013</a:t>
             </a:fld>
             <a:endParaRPr lang="fr-FR"/>
           </a:p>
@@ -527,31 +526,9 @@
           <a:bodyPr/>
           <a:lstStyle/>
           <a:p>
-            <a:pPr marL="171450" indent="-171450">
+            <a:pPr marL="0" indent="0">
               <a:buFontTx/>
-              <a:buChar char="-"/>
-            </a:pPr>
-            <a:r>
-              <a:rPr lang="en-CA" noProof="0" dirty="0" smtClean="0"/>
-              <a:t>Presenter could be a </a:t>
-            </a:r>
-            <a:r>
-              <a:rPr lang="en-CA" noProof="0" dirty="0" err="1" smtClean="0"/>
-              <a:t>javascript</a:t>
-            </a:r>
-            <a:r>
-              <a:rPr lang="en-CA" noProof="0" dirty="0" smtClean="0"/>
-              <a:t> object with state</a:t>
-            </a:r>
-            <a:r>
-              <a:rPr lang="en-CA" baseline="0" noProof="0" dirty="0" smtClean="0"/>
-              <a:t> fields that interact with view by events (fields are DOM event listeners)</a:t>
-            </a:r>
-          </a:p>
-          <a:p>
-            <a:pPr marL="171450" indent="-171450">
-              <a:buFontTx/>
-              <a:buChar char="-"/>
+              <a:buNone/>
             </a:pPr>
             <a:endParaRPr lang="en-CA" noProof="0" dirty="0"/>
           </a:p>
@@ -637,31 +614,9 @@
           <a:bodyPr/>
           <a:lstStyle/>
           <a:p>
-            <a:pPr marL="171450" indent="-171450">
+            <a:pPr marL="0" indent="0">
               <a:buFontTx/>
-              <a:buChar char="-"/>
-            </a:pPr>
-            <a:r>
-              <a:rPr lang="en-CA" noProof="0" dirty="0" smtClean="0"/>
-              <a:t>Presenter could be a </a:t>
-            </a:r>
-            <a:r>
-              <a:rPr lang="en-CA" noProof="0" dirty="0" err="1" smtClean="0"/>
-              <a:t>javascript</a:t>
-            </a:r>
-            <a:r>
-              <a:rPr lang="en-CA" noProof="0" dirty="0" smtClean="0"/>
-              <a:t> object with state</a:t>
-            </a:r>
-            <a:r>
-              <a:rPr lang="en-CA" baseline="0" noProof="0" dirty="0" smtClean="0"/>
-              <a:t> fields that interact with view by events (fields are DOM event listeners)</a:t>
-            </a:r>
-          </a:p>
-          <a:p>
-            <a:pPr marL="171450" indent="-171450">
-              <a:buFontTx/>
-              <a:buChar char="-"/>
+              <a:buNone/>
             </a:pPr>
             <a:endParaRPr lang="en-CA" noProof="0" dirty="0"/>
           </a:p>
@@ -694,226 +649,6 @@
     <p:extLst>
       <p:ext uri="{BB962C8B-B14F-4D97-AF65-F5344CB8AC3E}">
         <p14:creationId xmlns:p14="http://schemas.microsoft.com/office/powerpoint/2010/main" val="2751630236"/>
-      </p:ext>
-    </p:extLst>
-  </p:cSld>
-  <p:clrMapOvr>
-    <a:masterClrMapping/>
-  </p:clrMapOvr>
-</p:notes>
-</file>
-
-<file path=ppt/notesSlides/notesSlide3.xml><?xml version="1.0" encoding="utf-8"?>
-<p:notes xmlns:a="http://schemas.openxmlformats.org/drawingml/2006/main" xmlns:r="http://schemas.openxmlformats.org/officeDocument/2006/relationships" xmlns:p="http://schemas.openxmlformats.org/presentationml/2006/main">
-  <p:cSld>
-    <p:spTree>
-      <p:nvGrpSpPr>
-        <p:cNvPr id="1" name=""/>
-        <p:cNvGrpSpPr/>
-        <p:nvPr/>
-      </p:nvGrpSpPr>
-      <p:grpSpPr>
-        <a:xfrm>
-          <a:off x="0" y="0"/>
-          <a:ext cx="0" cy="0"/>
-          <a:chOff x="0" y="0"/>
-          <a:chExt cx="0" cy="0"/>
-        </a:xfrm>
-      </p:grpSpPr>
-      <p:sp>
-        <p:nvSpPr>
-          <p:cNvPr id="2" name="Slide Image Placeholder 1"/>
-          <p:cNvSpPr>
-            <a:spLocks noGrp="1" noRot="1" noChangeAspect="1"/>
-          </p:cNvSpPr>
-          <p:nvPr>
-            <p:ph type="sldImg"/>
-          </p:nvPr>
-        </p:nvSpPr>
-        <p:spPr/>
-      </p:sp>
-      <p:sp>
-        <p:nvSpPr>
-          <p:cNvPr id="3" name="Notes Placeholder 2"/>
-          <p:cNvSpPr>
-            <a:spLocks noGrp="1"/>
-          </p:cNvSpPr>
-          <p:nvPr>
-            <p:ph type="body" idx="1"/>
-          </p:nvPr>
-        </p:nvSpPr>
-        <p:spPr/>
-        <p:txBody>
-          <a:bodyPr/>
-          <a:lstStyle/>
-          <a:p>
-            <a:pPr marL="171450" indent="-171450">
-              <a:buFontTx/>
-              <a:buChar char="-"/>
-            </a:pPr>
-            <a:r>
-              <a:rPr lang="en-CA" noProof="0" dirty="0" smtClean="0"/>
-              <a:t>Presenter could be a </a:t>
-            </a:r>
-            <a:r>
-              <a:rPr lang="en-CA" noProof="0" dirty="0" err="1" smtClean="0"/>
-              <a:t>javascript</a:t>
-            </a:r>
-            <a:r>
-              <a:rPr lang="en-CA" noProof="0" dirty="0" smtClean="0"/>
-              <a:t> object with state</a:t>
-            </a:r>
-            <a:r>
-              <a:rPr lang="en-CA" baseline="0" noProof="0" dirty="0" smtClean="0"/>
-              <a:t> fields that interact with view by events (fields are DOM event listeners)</a:t>
-            </a:r>
-          </a:p>
-          <a:p>
-            <a:pPr marL="171450" indent="-171450">
-              <a:buFontTx/>
-              <a:buChar char="-"/>
-            </a:pPr>
-            <a:endParaRPr lang="en-CA" noProof="0" dirty="0"/>
-          </a:p>
-        </p:txBody>
-      </p:sp>
-      <p:sp>
-        <p:nvSpPr>
-          <p:cNvPr id="4" name="Slide Number Placeholder 3"/>
-          <p:cNvSpPr>
-            <a:spLocks noGrp="1"/>
-          </p:cNvSpPr>
-          <p:nvPr>
-            <p:ph type="sldNum" sz="quarter" idx="10"/>
-          </p:nvPr>
-        </p:nvSpPr>
-        <p:spPr/>
-        <p:txBody>
-          <a:bodyPr/>
-          <a:lstStyle/>
-          <a:p>
-            <a:fld id="{1EBCEF40-0E7B-404D-832C-DC6E08B53B2B}" type="slidenum">
-              <a:rPr lang="fr-FR" smtClean="0"/>
-              <a:t>6</a:t>
-            </a:fld>
-            <a:endParaRPr lang="fr-FR"/>
-          </a:p>
-        </p:txBody>
-      </p:sp>
-    </p:spTree>
-    <p:extLst>
-      <p:ext uri="{BB962C8B-B14F-4D97-AF65-F5344CB8AC3E}">
-        <p14:creationId xmlns:p14="http://schemas.microsoft.com/office/powerpoint/2010/main" val="954477242"/>
-      </p:ext>
-    </p:extLst>
-  </p:cSld>
-  <p:clrMapOvr>
-    <a:masterClrMapping/>
-  </p:clrMapOvr>
-</p:notes>
-</file>
-
-<file path=ppt/notesSlides/notesSlide4.xml><?xml version="1.0" encoding="utf-8"?>
-<p:notes xmlns:a="http://schemas.openxmlformats.org/drawingml/2006/main" xmlns:r="http://schemas.openxmlformats.org/officeDocument/2006/relationships" xmlns:p="http://schemas.openxmlformats.org/presentationml/2006/main">
-  <p:cSld>
-    <p:spTree>
-      <p:nvGrpSpPr>
-        <p:cNvPr id="1" name=""/>
-        <p:cNvGrpSpPr/>
-        <p:nvPr/>
-      </p:nvGrpSpPr>
-      <p:grpSpPr>
-        <a:xfrm>
-          <a:off x="0" y="0"/>
-          <a:ext cx="0" cy="0"/>
-          <a:chOff x="0" y="0"/>
-          <a:chExt cx="0" cy="0"/>
-        </a:xfrm>
-      </p:grpSpPr>
-      <p:sp>
-        <p:nvSpPr>
-          <p:cNvPr id="2" name="Slide Image Placeholder 1"/>
-          <p:cNvSpPr>
-            <a:spLocks noGrp="1" noRot="1" noChangeAspect="1"/>
-          </p:cNvSpPr>
-          <p:nvPr>
-            <p:ph type="sldImg"/>
-          </p:nvPr>
-        </p:nvSpPr>
-        <p:spPr/>
-      </p:sp>
-      <p:sp>
-        <p:nvSpPr>
-          <p:cNvPr id="3" name="Notes Placeholder 2"/>
-          <p:cNvSpPr>
-            <a:spLocks noGrp="1"/>
-          </p:cNvSpPr>
-          <p:nvPr>
-            <p:ph type="body" idx="1"/>
-          </p:nvPr>
-        </p:nvSpPr>
-        <p:spPr/>
-        <p:txBody>
-          <a:bodyPr/>
-          <a:lstStyle/>
-          <a:p>
-            <a:pPr marL="171450" indent="-171450">
-              <a:buFontTx/>
-              <a:buChar char="-"/>
-            </a:pPr>
-            <a:r>
-              <a:rPr lang="en-CA" noProof="0" dirty="0" smtClean="0"/>
-              <a:t>Presenter could be a </a:t>
-            </a:r>
-            <a:r>
-              <a:rPr lang="en-CA" noProof="0" dirty="0" err="1" smtClean="0"/>
-              <a:t>javascript</a:t>
-            </a:r>
-            <a:r>
-              <a:rPr lang="en-CA" noProof="0" dirty="0" smtClean="0"/>
-              <a:t> object with state</a:t>
-            </a:r>
-            <a:r>
-              <a:rPr lang="en-CA" baseline="0" noProof="0" dirty="0" smtClean="0"/>
-              <a:t> fields that interact with view by events (fields are DOM event listeners)</a:t>
-            </a:r>
-          </a:p>
-          <a:p>
-            <a:pPr marL="171450" indent="-171450">
-              <a:buFontTx/>
-              <a:buChar char="-"/>
-            </a:pPr>
-            <a:endParaRPr lang="en-CA" noProof="0" dirty="0"/>
-          </a:p>
-        </p:txBody>
-      </p:sp>
-      <p:sp>
-        <p:nvSpPr>
-          <p:cNvPr id="4" name="Slide Number Placeholder 3"/>
-          <p:cNvSpPr>
-            <a:spLocks noGrp="1"/>
-          </p:cNvSpPr>
-          <p:nvPr>
-            <p:ph type="sldNum" sz="quarter" idx="10"/>
-          </p:nvPr>
-        </p:nvSpPr>
-        <p:spPr/>
-        <p:txBody>
-          <a:bodyPr/>
-          <a:lstStyle/>
-          <a:p>
-            <a:fld id="{1EBCEF40-0E7B-404D-832C-DC6E08B53B2B}" type="slidenum">
-              <a:rPr lang="fr-FR" smtClean="0"/>
-              <a:t>7</a:t>
-            </a:fld>
-            <a:endParaRPr lang="fr-FR"/>
-          </a:p>
-        </p:txBody>
-      </p:sp>
-    </p:spTree>
-    <p:extLst>
-      <p:ext uri="{BB962C8B-B14F-4D97-AF65-F5344CB8AC3E}">
-        <p14:creationId xmlns:p14="http://schemas.microsoft.com/office/powerpoint/2010/main" val="3538081368"/>
       </p:ext>
     </p:extLst>
   </p:cSld>
@@ -1054,7 +789,7 @@
           <a:p>
             <a:fld id="{9B0E7100-CB1C-4906-903B-B0AA84BE9C13}" type="datetimeFigureOut">
               <a:rPr lang="fr-FR" smtClean="0"/>
-              <a:t>16/10/2013</a:t>
+              <a:t>21/10/2013</a:t>
             </a:fld>
             <a:endParaRPr lang="fr-FR"/>
           </a:p>
@@ -1224,7 +959,7 @@
           <a:p>
             <a:fld id="{9B0E7100-CB1C-4906-903B-B0AA84BE9C13}" type="datetimeFigureOut">
               <a:rPr lang="fr-FR" smtClean="0"/>
-              <a:t>16/10/2013</a:t>
+              <a:t>21/10/2013</a:t>
             </a:fld>
             <a:endParaRPr lang="fr-FR"/>
           </a:p>
@@ -1404,7 +1139,7 @@
           <a:p>
             <a:fld id="{9B0E7100-CB1C-4906-903B-B0AA84BE9C13}" type="datetimeFigureOut">
               <a:rPr lang="fr-FR" smtClean="0"/>
-              <a:t>16/10/2013</a:t>
+              <a:t>21/10/2013</a:t>
             </a:fld>
             <a:endParaRPr lang="fr-FR"/>
           </a:p>
@@ -1574,7 +1309,7 @@
           <a:p>
             <a:fld id="{9B0E7100-CB1C-4906-903B-B0AA84BE9C13}" type="datetimeFigureOut">
               <a:rPr lang="fr-FR" smtClean="0"/>
-              <a:t>16/10/2013</a:t>
+              <a:t>21/10/2013</a:t>
             </a:fld>
             <a:endParaRPr lang="fr-FR"/>
           </a:p>
@@ -1820,7 +1555,7 @@
           <a:p>
             <a:fld id="{9B0E7100-CB1C-4906-903B-B0AA84BE9C13}" type="datetimeFigureOut">
               <a:rPr lang="fr-FR" smtClean="0"/>
-              <a:t>16/10/2013</a:t>
+              <a:t>21/10/2013</a:t>
             </a:fld>
             <a:endParaRPr lang="fr-FR"/>
           </a:p>
@@ -2052,7 +1787,7 @@
           <a:p>
             <a:fld id="{9B0E7100-CB1C-4906-903B-B0AA84BE9C13}" type="datetimeFigureOut">
               <a:rPr lang="fr-FR" smtClean="0"/>
-              <a:t>16/10/2013</a:t>
+              <a:t>21/10/2013</a:t>
             </a:fld>
             <a:endParaRPr lang="fr-FR"/>
           </a:p>
@@ -2419,7 +2154,7 @@
           <a:p>
             <a:fld id="{9B0E7100-CB1C-4906-903B-B0AA84BE9C13}" type="datetimeFigureOut">
               <a:rPr lang="fr-FR" smtClean="0"/>
-              <a:t>16/10/2013</a:t>
+              <a:t>21/10/2013</a:t>
             </a:fld>
             <a:endParaRPr lang="fr-FR"/>
           </a:p>
@@ -2537,7 +2272,7 @@
           <a:p>
             <a:fld id="{9B0E7100-CB1C-4906-903B-B0AA84BE9C13}" type="datetimeFigureOut">
               <a:rPr lang="fr-FR" smtClean="0"/>
-              <a:t>16/10/2013</a:t>
+              <a:t>21/10/2013</a:t>
             </a:fld>
             <a:endParaRPr lang="fr-FR"/>
           </a:p>
@@ -2632,7 +2367,7 @@
           <a:p>
             <a:fld id="{9B0E7100-CB1C-4906-903B-B0AA84BE9C13}" type="datetimeFigureOut">
               <a:rPr lang="fr-FR" smtClean="0"/>
-              <a:t>16/10/2013</a:t>
+              <a:t>21/10/2013</a:t>
             </a:fld>
             <a:endParaRPr lang="fr-FR"/>
           </a:p>
@@ -2909,7 +2644,7 @@
           <a:p>
             <a:fld id="{9B0E7100-CB1C-4906-903B-B0AA84BE9C13}" type="datetimeFigureOut">
               <a:rPr lang="fr-FR" smtClean="0"/>
-              <a:t>16/10/2013</a:t>
+              <a:t>21/10/2013</a:t>
             </a:fld>
             <a:endParaRPr lang="fr-FR"/>
           </a:p>
@@ -3162,7 +2897,7 @@
           <a:p>
             <a:fld id="{9B0E7100-CB1C-4906-903B-B0AA84BE9C13}" type="datetimeFigureOut">
               <a:rPr lang="fr-FR" smtClean="0"/>
-              <a:t>16/10/2013</a:t>
+              <a:t>21/10/2013</a:t>
             </a:fld>
             <a:endParaRPr lang="fr-FR"/>
           </a:p>
@@ -3375,7 +3110,7 @@
           <a:p>
             <a:fld id="{9B0E7100-CB1C-4906-903B-B0AA84BE9C13}" type="datetimeFigureOut">
               <a:rPr lang="fr-FR" smtClean="0"/>
-              <a:t>16/10/2013</a:t>
+              <a:t>21/10/2013</a:t>
             </a:fld>
             <a:endParaRPr lang="fr-FR"/>
           </a:p>
@@ -3790,16 +3525,23 @@
             <p:ph type="ctrTitle"/>
           </p:nvPr>
         </p:nvSpPr>
-        <p:spPr/>
-        <p:txBody>
-          <a:bodyPr/>
+        <p:spPr>
+          <a:xfrm>
+            <a:off x="1524000" y="2554014"/>
+            <a:ext cx="9144000" cy="955949"/>
+          </a:xfrm>
+        </p:spPr>
+        <p:txBody>
+          <a:bodyPr>
+            <a:normAutofit/>
+          </a:bodyPr>
           <a:lstStyle/>
           <a:p>
             <a:r>
               <a:rPr lang="fr-FR" dirty="0" smtClean="0">
                 <a:latin typeface="Ubuntu Light" panose="020B0304030602030204" pitchFamily="34" charset="0"/>
               </a:rPr>
-              <a:t>Knockout.js</a:t>
+              <a:t>Require.js</a:t>
             </a:r>
             <a:endParaRPr lang="fr-FR" dirty="0">
               <a:latin typeface="Ubuntu Light" panose="020B0304030602030204" pitchFamily="34" charset="0"/>
@@ -3817,42 +3559,23 @@
             <p:ph type="subTitle" idx="1"/>
           </p:nvPr>
         </p:nvSpPr>
-        <p:spPr/>
-        <p:txBody>
-          <a:bodyPr/>
-          <a:lstStyle/>
-          <a:p>
-            <a:r>
-              <a:rPr lang="fr-FR" dirty="0" err="1" smtClean="0">
+        <p:spPr>
+          <a:xfrm>
+            <a:off x="1524000" y="3602038"/>
+            <a:ext cx="9144000" cy="444445"/>
+          </a:xfrm>
+        </p:spPr>
+        <p:txBody>
+          <a:bodyPr/>
+          <a:lstStyle/>
+          <a:p>
+            <a:r>
+              <a:rPr lang="en-CA" dirty="0" smtClean="0">
                 <a:latin typeface="Ubuntu Light" panose="020B0304030602030204" pitchFamily="34" charset="0"/>
               </a:rPr>
-              <a:t>Join</a:t>
-            </a:r>
-            <a:r>
-              <a:rPr lang="fr-FR" dirty="0" smtClean="0">
-                <a:latin typeface="Ubuntu Light" panose="020B0304030602030204" pitchFamily="34" charset="0"/>
-              </a:rPr>
-              <a:t> power, </a:t>
-            </a:r>
-            <a:r>
-              <a:rPr lang="fr-FR" dirty="0" err="1">
-                <a:latin typeface="Ubuntu Light" panose="020B0304030602030204" pitchFamily="34" charset="0"/>
-              </a:rPr>
-              <a:t>p</a:t>
-            </a:r>
-            <a:r>
-              <a:rPr lang="fr-FR" dirty="0" err="1" smtClean="0">
-                <a:latin typeface="Ubuntu Light" panose="020B0304030602030204" pitchFamily="34" charset="0"/>
-              </a:rPr>
-              <a:t>ass</a:t>
-            </a:r>
-            <a:r>
-              <a:rPr lang="fr-FR" dirty="0" smtClean="0">
-                <a:latin typeface="Ubuntu Light" panose="020B0304030602030204" pitchFamily="34" charset="0"/>
-              </a:rPr>
-              <a:t> to future</a:t>
-            </a:r>
-            <a:endParaRPr lang="fr-FR" dirty="0">
+              <a:t>Be modular</a:t>
+            </a:r>
+            <a:endParaRPr lang="en-CA" dirty="0">
               <a:latin typeface="Ubuntu Light" panose="020B0304030602030204" pitchFamily="34" charset="0"/>
             </a:endParaRPr>
           </a:p>
@@ -3911,12 +3634,12 @@
           <a:lstStyle/>
           <a:p>
             <a:r>
-              <a:rPr lang="fr-FR" dirty="0" smtClean="0">
+              <a:rPr lang="en-CA" dirty="0" smtClean="0">
                 <a:latin typeface="Ubuntu Condensed" panose="020B0506030602030204" pitchFamily="34" charset="0"/>
               </a:rPr>
-              <a:t>Evolution </a:t>
-            </a:r>
-            <a:endParaRPr lang="fr-FR" dirty="0">
+              <a:t>Asynchronous module definition</a:t>
+            </a:r>
+            <a:endParaRPr lang="en-CA" dirty="0">
               <a:latin typeface="Ubuntu Condensed" panose="020B0506030602030204" pitchFamily="34" charset="0"/>
             </a:endParaRPr>
           </a:p>
@@ -3935,7 +3658,7 @@
         <p:spPr>
           <a:xfrm>
             <a:off x="838200" y="2219570"/>
-            <a:ext cx="10515600" cy="1860061"/>
+            <a:ext cx="10515600" cy="2362940"/>
           </a:xfrm>
         </p:spPr>
         <p:txBody>
@@ -3943,86 +3666,34 @@
           <a:lstStyle/>
           <a:p>
             <a:r>
-              <a:rPr lang="fr-FR" dirty="0" smtClean="0">
+              <a:rPr lang="en-CA" dirty="0" smtClean="0">
                 <a:latin typeface="Ubuntu Light" panose="020B0304030602030204" pitchFamily="34" charset="0"/>
               </a:rPr>
-              <a:t>MVC (Model-</a:t>
-            </a:r>
-            <a:r>
-              <a:rPr lang="fr-FR" dirty="0" err="1" smtClean="0">
+              <a:t>Avoid global variables collisions</a:t>
+            </a:r>
+          </a:p>
+          <a:p>
+            <a:r>
+              <a:rPr lang="en-CA" dirty="0" smtClean="0">
                 <a:latin typeface="Ubuntu Light" panose="020B0304030602030204" pitchFamily="34" charset="0"/>
               </a:rPr>
-              <a:t>View</a:t>
-            </a:r>
-            <a:r>
-              <a:rPr lang="fr-FR" dirty="0" smtClean="0">
+              <a:t>Description and intelligent management of dependencies</a:t>
+            </a:r>
+          </a:p>
+          <a:p>
+            <a:r>
+              <a:rPr lang="en-CA" dirty="0" smtClean="0">
                 <a:latin typeface="Ubuntu Light" panose="020B0304030602030204" pitchFamily="34" charset="0"/>
               </a:rPr>
-              <a:t>-Controller)</a:t>
-            </a:r>
-          </a:p>
-          <a:p>
-            <a:r>
-              <a:rPr lang="fr-FR" dirty="0" smtClean="0">
+              <a:t>Deep application decoupling</a:t>
+            </a:r>
+          </a:p>
+          <a:p>
+            <a:r>
+              <a:rPr lang="en-CA" dirty="0" smtClean="0">
                 <a:latin typeface="Ubuntu Light" panose="020B0304030602030204" pitchFamily="34" charset="0"/>
               </a:rPr>
-              <a:t>MVP (Model-</a:t>
-            </a:r>
-            <a:r>
-              <a:rPr lang="fr-FR" dirty="0" err="1" smtClean="0">
-                <a:latin typeface="Ubuntu Light" panose="020B0304030602030204" pitchFamily="34" charset="0"/>
-              </a:rPr>
-              <a:t>View</a:t>
-            </a:r>
-            <a:r>
-              <a:rPr lang="fr-FR" dirty="0" smtClean="0">
-                <a:latin typeface="Ubuntu Light" panose="020B0304030602030204" pitchFamily="34" charset="0"/>
-              </a:rPr>
-              <a:t>-</a:t>
-            </a:r>
-            <a:r>
-              <a:rPr lang="fr-FR" dirty="0" err="1" smtClean="0">
-                <a:latin typeface="Ubuntu Light" panose="020B0304030602030204" pitchFamily="34" charset="0"/>
-              </a:rPr>
-              <a:t>Presenter</a:t>
-            </a:r>
-            <a:r>
-              <a:rPr lang="fr-FR" dirty="0" smtClean="0">
-                <a:latin typeface="Ubuntu Light" panose="020B0304030602030204" pitchFamily="34" charset="0"/>
-              </a:rPr>
-              <a:t>)</a:t>
-            </a:r>
-          </a:p>
-          <a:p>
-            <a:r>
-              <a:rPr lang="fr-FR" dirty="0" smtClean="0">
-                <a:latin typeface="Ubuntu Light" panose="020B0304030602030204" pitchFamily="34" charset="0"/>
-              </a:rPr>
-              <a:t>MVVM (Model-</a:t>
-            </a:r>
-            <a:r>
-              <a:rPr lang="fr-FR" dirty="0" err="1" smtClean="0">
-                <a:latin typeface="Ubuntu Light" panose="020B0304030602030204" pitchFamily="34" charset="0"/>
-              </a:rPr>
-              <a:t>View</a:t>
-            </a:r>
-            <a:r>
-              <a:rPr lang="fr-FR" dirty="0" smtClean="0">
-                <a:latin typeface="Ubuntu Light" panose="020B0304030602030204" pitchFamily="34" charset="0"/>
-              </a:rPr>
-              <a:t>-</a:t>
-            </a:r>
-            <a:r>
-              <a:rPr lang="fr-FR" dirty="0" err="1" smtClean="0">
-                <a:latin typeface="Ubuntu Light" panose="020B0304030602030204" pitchFamily="34" charset="0"/>
-              </a:rPr>
-              <a:t>ViewModel</a:t>
-            </a:r>
-            <a:r>
-              <a:rPr lang="fr-FR" dirty="0" smtClean="0">
-                <a:latin typeface="Ubuntu Light" panose="020B0304030602030204" pitchFamily="34" charset="0"/>
-              </a:rPr>
-              <a:t>)</a:t>
+              <a:t>Code reusability</a:t>
             </a:r>
           </a:p>
           <a:p>
@@ -4096,7 +3767,7 @@
               <a:rPr lang="fr-FR" dirty="0" smtClean="0">
                 <a:latin typeface="Ubuntu Condensed" panose="020B0506030602030204" pitchFamily="34" charset="0"/>
               </a:rPr>
-              <a:t>MVC</a:t>
+              <a:t>AMD concepts</a:t>
             </a:r>
             <a:endParaRPr lang="fr-FR" dirty="0">
               <a:latin typeface="Ubuntu Condensed" panose="020B0506030602030204" pitchFamily="34" charset="0"/>
@@ -4104,49 +3775,6 @@
           </a:p>
         </p:txBody>
       </p:sp>
-      <p:pic>
-        <p:nvPicPr>
-          <p:cNvPr id="1026" name="Picture 2" descr="http://habrastorage.org/storage2/9c0/25b/523/9c025b52317a7ca79af3f26aa31b26b1.png"/>
-          <p:cNvPicPr>
-            <a:picLocks noGrp="1" noChangeAspect="1" noChangeArrowheads="1"/>
-          </p:cNvPicPr>
-          <p:nvPr>
-            <p:ph idx="1"/>
-          </p:nvPr>
-        </p:nvPicPr>
-        <p:blipFill>
-          <a:blip r:embed="rId2">
-            <a:extLst>
-              <a:ext uri="{28A0092B-C50C-407E-A947-70E740481C1C}">
-                <a14:useLocalDpi xmlns:a14="http://schemas.microsoft.com/office/drawing/2010/main" val="0"/>
-              </a:ext>
-            </a:extLst>
-          </a:blip>
-          <a:srcRect/>
-          <a:stretch>
-            <a:fillRect/>
-          </a:stretch>
-        </p:blipFill>
-        <p:spPr bwMode="auto">
-          <a:xfrm>
-            <a:off x="2135554" y="1047262"/>
-            <a:ext cx="6396892" cy="2806636"/>
-          </a:xfrm>
-          <a:prstGeom prst="rect">
-            <a:avLst/>
-          </a:prstGeom>
-          <a:noFill/>
-          <a:extLst>
-            <a:ext uri="{909E8E84-426E-40DD-AFC4-6F175D3DCCD1}">
-              <a14:hiddenFill xmlns:a14="http://schemas.microsoft.com/office/drawing/2010/main">
-                <a:solidFill>
-                  <a:srgbClr val="FFFFFF"/>
-                </a:solidFill>
-              </a14:hiddenFill>
-            </a:ext>
-          </a:extLst>
-        </p:spPr>
-      </p:pic>
       <p:sp>
         <p:nvSpPr>
           <p:cNvPr id="5" name="Content Placeholder 2"/>
@@ -4157,8 +3785,8 @@
         </p:nvSpPr>
         <p:spPr>
           <a:xfrm>
-            <a:off x="838200" y="3853898"/>
-            <a:ext cx="10515600" cy="2531271"/>
+            <a:off x="838200" y="2256325"/>
+            <a:ext cx="10515600" cy="1716586"/>
           </a:xfrm>
           <a:prstGeom prst="rect">
             <a:avLst/>
@@ -4337,35 +3965,39 @@
               <a:rPr lang="en-GB" sz="2400" dirty="0" smtClean="0">
                 <a:latin typeface="Ubuntu Light" panose="020B0304030602030204" pitchFamily="34" charset="0"/>
               </a:rPr>
-              <a:t>Lifecycle is well adapted for request/response architecture</a:t>
-            </a:r>
-          </a:p>
-          <a:p>
+              <a:t>Module description with a </a:t>
+            </a:r>
+            <a:r>
+              <a:rPr lang="en-GB" sz="2400" b="1" i="1" dirty="0" smtClean="0">
+                <a:latin typeface="Ubuntu Light" panose="020B0304030602030204" pitchFamily="34" charset="0"/>
+              </a:rPr>
+              <a:t>define</a:t>
+            </a:r>
             <a:r>
               <a:rPr lang="en-GB" sz="2400" dirty="0" smtClean="0">
                 <a:latin typeface="Ubuntu Light" panose="020B0304030602030204" pitchFamily="34" charset="0"/>
               </a:rPr>
-              <a:t>After </a:t>
-            </a:r>
-            <a:r>
-              <a:rPr lang="en-GB" sz="2400" dirty="0" err="1" smtClean="0">
-                <a:latin typeface="Ubuntu Light" panose="020B0304030602030204" pitchFamily="34" charset="0"/>
-              </a:rPr>
-              <a:t>ajax</a:t>
-            </a:r>
+              <a:t> function</a:t>
+            </a:r>
+          </a:p>
+          <a:p>
             <a:r>
               <a:rPr lang="en-GB" sz="2400" dirty="0" smtClean="0">
                 <a:latin typeface="Ubuntu Light" panose="020B0304030602030204" pitchFamily="34" charset="0"/>
               </a:rPr>
-              <a:t> and single-page propagation seems to be limited</a:t>
-            </a:r>
-          </a:p>
-          <a:p>
+              <a:t>Module requesting with a </a:t>
+            </a:r>
+            <a:r>
+              <a:rPr lang="en-GB" sz="2400" b="1" i="1" dirty="0" smtClean="0">
+                <a:latin typeface="Ubuntu Light" panose="020B0304030602030204" pitchFamily="34" charset="0"/>
+              </a:rPr>
+              <a:t>require</a:t>
+            </a:r>
             <a:r>
               <a:rPr lang="en-GB" sz="2400" dirty="0" smtClean="0">
                 <a:latin typeface="Ubuntu Light" panose="020B0304030602030204" pitchFamily="34" charset="0"/>
               </a:rPr>
-              <a:t>Lifecycle increasing means appearance of more and more logic on the controller</a:t>
+              <a:t> function</a:t>
             </a:r>
           </a:p>
           <a:p>
@@ -4373,9 +4005,9 @@
               <a:rPr lang="en-GB" sz="2400" dirty="0" smtClean="0">
                 <a:latin typeface="Ubuntu Light" panose="020B0304030602030204" pitchFamily="34" charset="0"/>
               </a:rPr>
-              <a:t>No one wants to dispatch a logic between a parts of application</a:t>
-            </a:r>
-            <a:endParaRPr lang="en-GB" sz="2400" dirty="0">
+              <a:t>Requires configuration</a:t>
+            </a:r>
+            <a:endParaRPr lang="en-GB" sz="2400" dirty="0" smtClean="0">
               <a:latin typeface="Ubuntu Light" panose="020B0304030602030204" pitchFamily="34" charset="0"/>
             </a:endParaRPr>
           </a:p>
@@ -4434,12 +4066,12 @@
           <a:lstStyle/>
           <a:p>
             <a:r>
-              <a:rPr lang="fr-FR" dirty="0" smtClean="0">
+              <a:rPr lang="en-CA" dirty="0" smtClean="0">
                 <a:latin typeface="Ubuntu Condensed" panose="020B0506030602030204" pitchFamily="34" charset="0"/>
               </a:rPr>
-              <a:t>MVP</a:t>
-            </a:r>
-            <a:endParaRPr lang="fr-FR" dirty="0">
+              <a:t>How it works</a:t>
+            </a:r>
+            <a:endParaRPr lang="en-CA" dirty="0">
               <a:latin typeface="Ubuntu Condensed" panose="020B0506030602030204" pitchFamily="34" charset="0"/>
             </a:endParaRPr>
           </a:p>
@@ -4455,8 +4087,8 @@
         </p:nvSpPr>
         <p:spPr>
           <a:xfrm>
-            <a:off x="838200" y="2923189"/>
-            <a:ext cx="10515600" cy="1720374"/>
+            <a:off x="838200" y="1229710"/>
+            <a:ext cx="10515600" cy="5202621"/>
           </a:xfrm>
           <a:prstGeom prst="rect">
             <a:avLst/>
@@ -4631,66 +4263,210 @@
             </a:lvl9pPr>
           </a:lstStyle>
           <a:p>
-            <a:r>
-              <a:rPr lang="en-GB" sz="2400" dirty="0" smtClean="0">
+            <a:pPr marL="0" indent="0">
+              <a:buNone/>
+            </a:pPr>
+            <a:r>
+              <a:rPr lang="en-GB" sz="1800" dirty="0">
                 <a:latin typeface="Ubuntu Light" panose="020B0304030602030204" pitchFamily="34" charset="0"/>
               </a:rPr>
-              <a:t>Presenter means intermediary that represents view state </a:t>
-            </a:r>
-            <a:r>
-              <a:rPr lang="en-GB" sz="2400" dirty="0" smtClean="0">
+              <a:t>View:</a:t>
+            </a:r>
+          </a:p>
+          <a:p>
+            <a:pPr marL="0" indent="0">
+              <a:buNone/>
+            </a:pPr>
+            <a:r>
+              <a:rPr lang="en-US" sz="1800" dirty="0">
+                <a:latin typeface="Ubuntu Mono" panose="020B0509030602030204" pitchFamily="49" charset="0"/>
+              </a:rPr>
+              <a:t>&lt;</a:t>
+            </a:r>
+            <a:r>
+              <a:rPr lang="en-US" sz="1800" dirty="0" smtClean="0">
+                <a:latin typeface="Ubuntu Mono" panose="020B0509030602030204" pitchFamily="49" charset="0"/>
+              </a:rPr>
+              <a:t>script </a:t>
+            </a:r>
+            <a:r>
+              <a:rPr lang="en-US" sz="1800" dirty="0" err="1" smtClean="0">
+                <a:latin typeface="Ubuntu Mono" panose="020B0509030602030204" pitchFamily="49" charset="0"/>
+              </a:rPr>
+              <a:t>src</a:t>
+            </a:r>
+            <a:r>
+              <a:rPr lang="en-US" sz="1800" dirty="0">
+                <a:latin typeface="Ubuntu Mono" panose="020B0509030602030204" pitchFamily="49" charset="0"/>
+              </a:rPr>
+              <a:t>="/</a:t>
+            </a:r>
+            <a:r>
+              <a:rPr lang="en-US" sz="1800" dirty="0" err="1">
+                <a:latin typeface="Ubuntu Mono" panose="020B0509030602030204" pitchFamily="49" charset="0"/>
+              </a:rPr>
+              <a:t>js</a:t>
+            </a:r>
+            <a:r>
+              <a:rPr lang="en-US" sz="1800" dirty="0">
+                <a:latin typeface="Ubuntu Mono" panose="020B0509030602030204" pitchFamily="49" charset="0"/>
+              </a:rPr>
+              <a:t>/require.js"&gt;&lt;/script</a:t>
+            </a:r>
+            <a:r>
+              <a:rPr lang="en-US" sz="1800" dirty="0" smtClean="0">
+                <a:latin typeface="Ubuntu Mono" panose="020B0509030602030204" pitchFamily="49" charset="0"/>
+              </a:rPr>
+              <a:t>&gt;</a:t>
+            </a:r>
+          </a:p>
+          <a:p>
+            <a:pPr marL="0" indent="0">
+              <a:buNone/>
+            </a:pPr>
+            <a:endParaRPr lang="en-GB" sz="1800" dirty="0">
+              <a:latin typeface="Ubuntu Light" panose="020B0304030602030204" pitchFamily="34" charset="0"/>
+            </a:endParaRPr>
+          </a:p>
+          <a:p>
+            <a:pPr marL="0" indent="0">
+              <a:buNone/>
+            </a:pPr>
+            <a:r>
+              <a:rPr lang="en-GB" sz="1800" dirty="0" smtClean="0">
                 <a:latin typeface="Ubuntu Light" panose="020B0304030602030204" pitchFamily="34" charset="0"/>
               </a:rPr>
-              <a:t>(</a:t>
-            </a:r>
-            <a:r>
-              <a:rPr lang="en-GB" sz="2400" dirty="0" err="1" smtClean="0">
+              <a:t>Script:</a:t>
+            </a:r>
+            <a:endParaRPr lang="en-GB" sz="1800" dirty="0">
+              <a:latin typeface="Ubuntu Light" panose="020B0304030602030204" pitchFamily="34" charset="0"/>
+            </a:endParaRPr>
+          </a:p>
+          <a:p>
+            <a:pPr marL="0" indent="0">
+              <a:buNone/>
+            </a:pPr>
+            <a:r>
+              <a:rPr lang="fr-FR" sz="1800" dirty="0" err="1" smtClean="0">
+                <a:latin typeface="Ubuntu Mono" panose="020B0509030602030204" pitchFamily="49" charset="0"/>
+              </a:rPr>
+              <a:t>define</a:t>
+            </a:r>
+            <a:r>
+              <a:rPr lang="fr-FR" sz="1800" dirty="0" smtClean="0">
+                <a:latin typeface="Ubuntu Mono" panose="020B0509030602030204" pitchFamily="49" charset="0"/>
+              </a:rPr>
+              <a:t> ({</a:t>
+            </a:r>
+            <a:r>
+              <a:rPr lang="fr-FR" sz="1800" dirty="0" err="1" smtClean="0">
+                <a:latin typeface="Ubuntu Mono" panose="020B0509030602030204" pitchFamily="49" charset="0"/>
+              </a:rPr>
+              <a:t>mymodule</a:t>
+            </a:r>
+            <a:r>
+              <a:rPr lang="fr-FR" sz="1800" dirty="0" smtClean="0">
+                <a:latin typeface="Ubuntu Mono" panose="020B0509030602030204" pitchFamily="49" charset="0"/>
+              </a:rPr>
+              <a:t> : -1 })</a:t>
+            </a:r>
+          </a:p>
+          <a:p>
+            <a:pPr marL="0" indent="0">
+              <a:buNone/>
+            </a:pPr>
+            <a:r>
+              <a:rPr lang="fr-FR" sz="1800" dirty="0" err="1" smtClean="0">
+                <a:latin typeface="Ubuntu Mono" panose="020B0509030602030204" pitchFamily="49" charset="0"/>
+              </a:rPr>
+              <a:t>require</a:t>
+            </a:r>
+            <a:r>
+              <a:rPr lang="fr-FR" sz="1800" dirty="0" smtClean="0">
+                <a:latin typeface="Ubuntu Mono" panose="020B0509030602030204" pitchFamily="49" charset="0"/>
+              </a:rPr>
+              <a:t> ([‘</a:t>
+            </a:r>
+            <a:r>
+              <a:rPr lang="fr-FR" sz="1800" dirty="0" err="1" smtClean="0">
+                <a:latin typeface="Ubuntu Mono" panose="020B0509030602030204" pitchFamily="49" charset="0"/>
+              </a:rPr>
+              <a:t>mymodule</a:t>
+            </a:r>
+            <a:r>
+              <a:rPr lang="fr-FR" sz="1800" dirty="0" smtClean="0">
+                <a:latin typeface="Ubuntu Mono" panose="020B0509030602030204" pitchFamily="49" charset="0"/>
+              </a:rPr>
+              <a:t>’, ‘</a:t>
+            </a:r>
+            <a:r>
+              <a:rPr lang="fr-FR" sz="1800" dirty="0" err="1" smtClean="0">
+                <a:latin typeface="Ubuntu Mono" panose="020B0509030602030204" pitchFamily="49" charset="0"/>
+              </a:rPr>
+              <a:t>jquery</a:t>
+            </a:r>
+            <a:r>
+              <a:rPr lang="fr-FR" sz="1800" dirty="0" smtClean="0">
+                <a:latin typeface="Ubuntu Mono" panose="020B0509030602030204" pitchFamily="49" charset="0"/>
+              </a:rPr>
+              <a:t>’], </a:t>
+            </a:r>
+            <a:r>
+              <a:rPr lang="fr-FR" sz="1800" dirty="0" err="1" smtClean="0">
+                <a:latin typeface="Ubuntu Mono" panose="020B0509030602030204" pitchFamily="49" charset="0"/>
+              </a:rPr>
+              <a:t>function</a:t>
+            </a:r>
+            <a:r>
+              <a:rPr lang="fr-FR" sz="1800" dirty="0" smtClean="0">
+                <a:latin typeface="Ubuntu Mono" panose="020B0509030602030204" pitchFamily="49" charset="0"/>
+              </a:rPr>
+              <a:t>($) { /* Do </a:t>
+            </a:r>
+            <a:r>
+              <a:rPr lang="fr-FR" sz="1800" dirty="0" err="1" smtClean="0">
+                <a:latin typeface="Ubuntu Mono" panose="020B0509030602030204" pitchFamily="49" charset="0"/>
+              </a:rPr>
+              <a:t>something</a:t>
+            </a:r>
+            <a:r>
+              <a:rPr lang="fr-FR" sz="1800" dirty="0" smtClean="0">
+                <a:latin typeface="Ubuntu Mono" panose="020B0509030602030204" pitchFamily="49" charset="0"/>
+              </a:rPr>
+              <a:t> */ })</a:t>
+            </a:r>
+            <a:endParaRPr lang="en-GB" sz="1800" dirty="0">
+              <a:latin typeface="Ubuntu Mono" panose="020B0509030602030204" pitchFamily="49" charset="0"/>
+            </a:endParaRPr>
+          </a:p>
+          <a:p>
+            <a:pPr marL="0" indent="0">
+              <a:buNone/>
+            </a:pPr>
+            <a:endParaRPr lang="en-CA" sz="1800" dirty="0" smtClean="0">
+              <a:latin typeface="Ubuntu Light" panose="020B0304030602030204" pitchFamily="34" charset="0"/>
+            </a:endParaRPr>
+          </a:p>
+          <a:p>
+            <a:pPr marL="0" indent="0">
+              <a:buNone/>
+            </a:pPr>
+            <a:r>
+              <a:rPr lang="en-CA" sz="1800" dirty="0" smtClean="0">
                 <a:latin typeface="Ubuntu Light" panose="020B0304030602030204" pitchFamily="34" charset="0"/>
               </a:rPr>
-              <a:t>stateful</a:t>
-            </a:r>
-            <a:r>
-              <a:rPr lang="en-GB" sz="2400" dirty="0" smtClean="0">
-                <a:latin typeface="Ubuntu Light" panose="020B0304030602030204" pitchFamily="34" charset="0"/>
-              </a:rPr>
-              <a:t> or stateless)</a:t>
-            </a:r>
-          </a:p>
-          <a:p>
-            <a:r>
-              <a:rPr lang="en-CA" sz="2400" noProof="0" dirty="0" smtClean="0">
-                <a:latin typeface="Ubuntu Light" panose="020B0304030602030204" pitchFamily="34" charset="0"/>
-              </a:rPr>
-              <a:t>Presenter could be a </a:t>
-            </a:r>
-            <a:r>
-              <a:rPr lang="en-CA" sz="2400" noProof="0" dirty="0" err="1" smtClean="0">
-                <a:latin typeface="Ubuntu Light" panose="020B0304030602030204" pitchFamily="34" charset="0"/>
-              </a:rPr>
-              <a:t>javascript</a:t>
-            </a:r>
-            <a:r>
-              <a:rPr lang="en-CA" sz="2400" noProof="0" dirty="0" smtClean="0">
-                <a:latin typeface="Ubuntu Light" panose="020B0304030602030204" pitchFamily="34" charset="0"/>
-              </a:rPr>
-              <a:t> object with state</a:t>
-            </a:r>
-            <a:r>
-              <a:rPr lang="en-CA" sz="2400" baseline="0" noProof="0" dirty="0" smtClean="0">
-                <a:latin typeface="Ubuntu Light" panose="020B0304030602030204" pitchFamily="34" charset="0"/>
-              </a:rPr>
-              <a:t> fields that interact with view by events (fields are DOM event listeners)</a:t>
-            </a:r>
+              <a:t>You need to define only one script that point to your require.js and it will be make the rest of stuff. You can also configure base path and paths aliases. </a:t>
+            </a:r>
+            <a:endParaRPr lang="en-CA" sz="1800" dirty="0">
+              <a:latin typeface="Ubuntu Light" panose="020B0304030602030204" pitchFamily="34" charset="0"/>
+            </a:endParaRPr>
+          </a:p>
+          <a:p>
             <a:endParaRPr lang="en-CA" sz="2400" noProof="0" dirty="0" smtClean="0">
               <a:latin typeface="Ubuntu Light" panose="020B0304030602030204" pitchFamily="34" charset="0"/>
             </a:endParaRPr>
           </a:p>
           <a:p>
-            <a:endParaRPr lang="en-CA" sz="2400" noProof="0" dirty="0" smtClean="0">
-              <a:latin typeface="Ubuntu Light" panose="020B0304030602030204" pitchFamily="34" charset="0"/>
-            </a:endParaRPr>
-          </a:p>
-          <a:p>
             <a:endParaRPr lang="en-CA" sz="2400" baseline="0" noProof="0" dirty="0" smtClean="0">
               <a:latin typeface="Ubuntu Light" panose="020B0304030602030204" pitchFamily="34" charset="0"/>
             </a:endParaRPr>
@@ -4707,47 +4483,6 @@
           </a:p>
         </p:txBody>
       </p:sp>
-      <p:pic>
-        <p:nvPicPr>
-          <p:cNvPr id="2050" name="Picture 2" descr="http://habrastorage.org/storage1/f66878c8/fe2348ea/76cee647/bd5dbae6.png"/>
-          <p:cNvPicPr>
-            <a:picLocks noChangeAspect="1" noChangeArrowheads="1"/>
-          </p:cNvPicPr>
-          <p:nvPr/>
-        </p:nvPicPr>
-        <p:blipFill>
-          <a:blip r:embed="rId3">
-            <a:extLst>
-              <a:ext uri="{28A0092B-C50C-407E-A947-70E740481C1C}">
-                <a14:useLocalDpi xmlns:a14="http://schemas.microsoft.com/office/drawing/2010/main" val="0"/>
-              </a:ext>
-            </a:extLst>
-          </a:blip>
-          <a:srcRect/>
-          <a:stretch>
-            <a:fillRect/>
-          </a:stretch>
-        </p:blipFill>
-        <p:spPr bwMode="auto">
-          <a:xfrm>
-            <a:off x="3762375" y="1670900"/>
-            <a:ext cx="4667250" cy="628651"/>
-          </a:xfrm>
-          <a:prstGeom prst="rect">
-            <a:avLst/>
-          </a:prstGeom>
-          <a:noFill/>
-          <a:extLst>
-            <a:ext uri="{909E8E84-426E-40DD-AFC4-6F175D3DCCD1}">
-              <a14:hiddenFill xmlns:a14="http://schemas.microsoft.com/office/drawing/2010/main">
-                <a:solidFill>
-                  <a:srgbClr val="FFFFFF"/>
-                </a:solidFill>
-              </a14:hiddenFill>
-            </a:ext>
-          </a:extLst>
-        </p:spPr>
-      </p:pic>
     </p:spTree>
     <p:extLst>
       <p:ext uri="{BB962C8B-B14F-4D97-AF65-F5344CB8AC3E}">
@@ -4801,12 +4536,12 @@
           <a:lstStyle/>
           <a:p>
             <a:r>
-              <a:rPr lang="fr-FR" dirty="0" smtClean="0">
+              <a:rPr lang="en-CA" dirty="0" smtClean="0">
                 <a:latin typeface="Ubuntu Condensed" panose="020B0506030602030204" pitchFamily="34" charset="0"/>
               </a:rPr>
-              <a:t>MVVM</a:t>
-            </a:r>
-            <a:endParaRPr lang="fr-FR" dirty="0">
+              <a:t>References</a:t>
+            </a:r>
+            <a:endParaRPr lang="en-CA" dirty="0">
               <a:latin typeface="Ubuntu Condensed" panose="020B0506030602030204" pitchFamily="34" charset="0"/>
             </a:endParaRPr>
           </a:p>
@@ -4822,396 +4557,8 @@
         </p:nvSpPr>
         <p:spPr>
           <a:xfrm>
-            <a:off x="838200" y="2923189"/>
-            <a:ext cx="10515600" cy="1720374"/>
-          </a:xfrm>
-          <a:prstGeom prst="rect">
-            <a:avLst/>
-          </a:prstGeom>
-        </p:spPr>
-        <p:txBody>
-          <a:bodyPr vert="horz" lIns="91440" tIns="45720" rIns="91440" bIns="45720" rtlCol="0">
-            <a:normAutofit fontScale="92500"/>
-          </a:bodyPr>
-          <a:lstStyle>
-            <a:lvl1pPr marL="228600" indent="-228600" algn="l" defTabSz="914400" rtl="0" eaLnBrk="1" latinLnBrk="0" hangingPunct="1">
-              <a:lnSpc>
-                <a:spcPct val="90000"/>
-              </a:lnSpc>
-              <a:spcBef>
-                <a:spcPts val="1000"/>
-              </a:spcBef>
-              <a:buFont typeface="Arial" panose="020B0604020202020204" pitchFamily="34" charset="0"/>
-              <a:buChar char="•"/>
-              <a:defRPr sz="2800" kern="1200">
-                <a:solidFill>
-                  <a:schemeClr val="tx1"/>
-                </a:solidFill>
-                <a:latin typeface="+mn-lt"/>
-                <a:ea typeface="+mn-ea"/>
-                <a:cs typeface="+mn-cs"/>
-              </a:defRPr>
-            </a:lvl1pPr>
-            <a:lvl2pPr marL="685800" indent="-228600" algn="l" defTabSz="914400" rtl="0" eaLnBrk="1" latinLnBrk="0" hangingPunct="1">
-              <a:lnSpc>
-                <a:spcPct val="90000"/>
-              </a:lnSpc>
-              <a:spcBef>
-                <a:spcPts val="500"/>
-              </a:spcBef>
-              <a:buFont typeface="Arial" panose="020B0604020202020204" pitchFamily="34" charset="0"/>
-              <a:buChar char="•"/>
-              <a:defRPr sz="2400" kern="1200">
-                <a:solidFill>
-                  <a:schemeClr val="tx1"/>
-                </a:solidFill>
-                <a:latin typeface="+mn-lt"/>
-                <a:ea typeface="+mn-ea"/>
-                <a:cs typeface="+mn-cs"/>
-              </a:defRPr>
-            </a:lvl2pPr>
-            <a:lvl3pPr marL="1143000" indent="-228600" algn="l" defTabSz="914400" rtl="0" eaLnBrk="1" latinLnBrk="0" hangingPunct="1">
-              <a:lnSpc>
-                <a:spcPct val="90000"/>
-              </a:lnSpc>
-              <a:spcBef>
-                <a:spcPts val="500"/>
-              </a:spcBef>
-              <a:buFont typeface="Arial" panose="020B0604020202020204" pitchFamily="34" charset="0"/>
-              <a:buChar char="•"/>
-              <a:defRPr sz="2000" kern="1200">
-                <a:solidFill>
-                  <a:schemeClr val="tx1"/>
-                </a:solidFill>
-                <a:latin typeface="+mn-lt"/>
-                <a:ea typeface="+mn-ea"/>
-                <a:cs typeface="+mn-cs"/>
-              </a:defRPr>
-            </a:lvl3pPr>
-            <a:lvl4pPr marL="1600200" indent="-228600" algn="l" defTabSz="914400" rtl="0" eaLnBrk="1" latinLnBrk="0" hangingPunct="1">
-              <a:lnSpc>
-                <a:spcPct val="90000"/>
-              </a:lnSpc>
-              <a:spcBef>
-                <a:spcPts val="500"/>
-              </a:spcBef>
-              <a:buFont typeface="Arial" panose="020B0604020202020204" pitchFamily="34" charset="0"/>
-              <a:buChar char="•"/>
-              <a:defRPr sz="1800" kern="1200">
-                <a:solidFill>
-                  <a:schemeClr val="tx1"/>
-                </a:solidFill>
-                <a:latin typeface="+mn-lt"/>
-                <a:ea typeface="+mn-ea"/>
-                <a:cs typeface="+mn-cs"/>
-              </a:defRPr>
-            </a:lvl4pPr>
-            <a:lvl5pPr marL="2057400" indent="-228600" algn="l" defTabSz="914400" rtl="0" eaLnBrk="1" latinLnBrk="0" hangingPunct="1">
-              <a:lnSpc>
-                <a:spcPct val="90000"/>
-              </a:lnSpc>
-              <a:spcBef>
-                <a:spcPts val="500"/>
-              </a:spcBef>
-              <a:buFont typeface="Arial" panose="020B0604020202020204" pitchFamily="34" charset="0"/>
-              <a:buChar char="•"/>
-              <a:defRPr sz="1800" kern="1200">
-                <a:solidFill>
-                  <a:schemeClr val="tx1"/>
-                </a:solidFill>
-                <a:latin typeface="+mn-lt"/>
-                <a:ea typeface="+mn-ea"/>
-                <a:cs typeface="+mn-cs"/>
-              </a:defRPr>
-            </a:lvl5pPr>
-            <a:lvl6pPr marL="2514600" indent="-228600" algn="l" defTabSz="914400" rtl="0" eaLnBrk="1" latinLnBrk="0" hangingPunct="1">
-              <a:lnSpc>
-                <a:spcPct val="90000"/>
-              </a:lnSpc>
-              <a:spcBef>
-                <a:spcPts val="500"/>
-              </a:spcBef>
-              <a:buFont typeface="Arial" panose="020B0604020202020204" pitchFamily="34" charset="0"/>
-              <a:buChar char="•"/>
-              <a:defRPr sz="1800" kern="1200">
-                <a:solidFill>
-                  <a:schemeClr val="tx1"/>
-                </a:solidFill>
-                <a:latin typeface="+mn-lt"/>
-                <a:ea typeface="+mn-ea"/>
-                <a:cs typeface="+mn-cs"/>
-              </a:defRPr>
-            </a:lvl6pPr>
-            <a:lvl7pPr marL="2971800" indent="-228600" algn="l" defTabSz="914400" rtl="0" eaLnBrk="1" latinLnBrk="0" hangingPunct="1">
-              <a:lnSpc>
-                <a:spcPct val="90000"/>
-              </a:lnSpc>
-              <a:spcBef>
-                <a:spcPts val="500"/>
-              </a:spcBef>
-              <a:buFont typeface="Arial" panose="020B0604020202020204" pitchFamily="34" charset="0"/>
-              <a:buChar char="•"/>
-              <a:defRPr sz="1800" kern="1200">
-                <a:solidFill>
-                  <a:schemeClr val="tx1"/>
-                </a:solidFill>
-                <a:latin typeface="+mn-lt"/>
-                <a:ea typeface="+mn-ea"/>
-                <a:cs typeface="+mn-cs"/>
-              </a:defRPr>
-            </a:lvl7pPr>
-            <a:lvl8pPr marL="3429000" indent="-228600" algn="l" defTabSz="914400" rtl="0" eaLnBrk="1" latinLnBrk="0" hangingPunct="1">
-              <a:lnSpc>
-                <a:spcPct val="90000"/>
-              </a:lnSpc>
-              <a:spcBef>
-                <a:spcPts val="500"/>
-              </a:spcBef>
-              <a:buFont typeface="Arial" panose="020B0604020202020204" pitchFamily="34" charset="0"/>
-              <a:buChar char="•"/>
-              <a:defRPr sz="1800" kern="1200">
-                <a:solidFill>
-                  <a:schemeClr val="tx1"/>
-                </a:solidFill>
-                <a:latin typeface="+mn-lt"/>
-                <a:ea typeface="+mn-ea"/>
-                <a:cs typeface="+mn-cs"/>
-              </a:defRPr>
-            </a:lvl8pPr>
-            <a:lvl9pPr marL="3886200" indent="-228600" algn="l" defTabSz="914400" rtl="0" eaLnBrk="1" latinLnBrk="0" hangingPunct="1">
-              <a:lnSpc>
-                <a:spcPct val="90000"/>
-              </a:lnSpc>
-              <a:spcBef>
-                <a:spcPts val="500"/>
-              </a:spcBef>
-              <a:buFont typeface="Arial" panose="020B0604020202020204" pitchFamily="34" charset="0"/>
-              <a:buChar char="•"/>
-              <a:defRPr sz="1800" kern="1200">
-                <a:solidFill>
-                  <a:schemeClr val="tx1"/>
-                </a:solidFill>
-                <a:latin typeface="+mn-lt"/>
-                <a:ea typeface="+mn-ea"/>
-                <a:cs typeface="+mn-cs"/>
-              </a:defRPr>
-            </a:lvl9pPr>
-          </a:lstStyle>
-          <a:p>
-            <a:r>
-              <a:rPr lang="en-GB" sz="2400" dirty="0" err="1" smtClean="0">
-                <a:latin typeface="Ubuntu Light" panose="020B0304030602030204" pitchFamily="34" charset="0"/>
-              </a:rPr>
-              <a:t>ViewModel</a:t>
-            </a:r>
-            <a:r>
-              <a:rPr lang="en-GB" sz="2400" dirty="0" smtClean="0">
-                <a:latin typeface="Ubuntu Light" panose="020B0304030602030204" pitchFamily="34" charset="0"/>
-              </a:rPr>
-              <a:t> represents view state</a:t>
-            </a:r>
-          </a:p>
-          <a:p>
-            <a:r>
-              <a:rPr lang="en-GB" sz="2400" dirty="0" smtClean="0">
-                <a:latin typeface="Ubuntu Light" panose="020B0304030602030204" pitchFamily="34" charset="0"/>
-              </a:rPr>
-              <a:t>All communication between View and </a:t>
-            </a:r>
-            <a:r>
-              <a:rPr lang="en-GB" sz="2400" dirty="0" err="1" smtClean="0">
-                <a:latin typeface="Ubuntu Light" panose="020B0304030602030204" pitchFamily="34" charset="0"/>
-              </a:rPr>
-              <a:t>ViewModel</a:t>
-            </a:r>
-            <a:r>
-              <a:rPr lang="en-GB" sz="2400" dirty="0" smtClean="0">
-                <a:latin typeface="Ubuntu Light" panose="020B0304030602030204" pitchFamily="34" charset="0"/>
-              </a:rPr>
-              <a:t> pass by data binding events</a:t>
-            </a:r>
-          </a:p>
-          <a:p>
-            <a:r>
-              <a:rPr lang="en-CA" sz="2400" dirty="0" err="1" smtClean="0">
-                <a:latin typeface="Ubuntu Light" panose="020B0304030602030204" pitchFamily="34" charset="0"/>
-              </a:rPr>
-              <a:t>ViewModel</a:t>
-            </a:r>
-            <a:r>
-              <a:rPr lang="en-CA" sz="2400" dirty="0" smtClean="0">
-                <a:latin typeface="Ubuntu Light" panose="020B0304030602030204" pitchFamily="34" charset="0"/>
-              </a:rPr>
-              <a:t> needs </a:t>
-            </a:r>
-            <a:r>
-              <a:rPr lang="en-CA" sz="2400" dirty="0" err="1" smtClean="0">
-                <a:latin typeface="Ubuntu Light" panose="020B0304030602030204" pitchFamily="34" charset="0"/>
-              </a:rPr>
-              <a:t>alsow</a:t>
-            </a:r>
-            <a:r>
-              <a:rPr lang="en-CA" sz="2400" dirty="0" smtClean="0">
-                <a:latin typeface="Ubuntu Light" panose="020B0304030602030204" pitchFamily="34" charset="0"/>
-              </a:rPr>
-              <a:t> </a:t>
-            </a:r>
-            <a:r>
-              <a:rPr lang="en-CA" sz="2400" dirty="0" err="1" smtClean="0">
-                <a:latin typeface="Ubuntu Light" panose="020B0304030602030204" pitchFamily="34" charset="0"/>
-              </a:rPr>
-              <a:t>PubSub</a:t>
-            </a:r>
-            <a:r>
-              <a:rPr lang="en-CA" sz="2400" dirty="0">
-                <a:latin typeface="Ubuntu Light" panose="020B0304030602030204" pitchFamily="34" charset="0"/>
-              </a:rPr>
-              <a:t> </a:t>
-            </a:r>
-            <a:r>
-              <a:rPr lang="en-CA" sz="2400" dirty="0" smtClean="0">
-                <a:latin typeface="Ubuntu Light" panose="020B0304030602030204" pitchFamily="34" charset="0"/>
-              </a:rPr>
-              <a:t>(observable) infrastructure to support this kind of communication</a:t>
-            </a:r>
-            <a:endParaRPr lang="en-CA" sz="2400" noProof="0" dirty="0" smtClean="0">
-              <a:latin typeface="Ubuntu Light" panose="020B0304030602030204" pitchFamily="34" charset="0"/>
-            </a:endParaRPr>
-          </a:p>
-          <a:p>
-            <a:endParaRPr lang="en-CA" sz="2400" noProof="0" dirty="0" smtClean="0">
-              <a:latin typeface="Ubuntu Light" panose="020B0304030602030204" pitchFamily="34" charset="0"/>
-            </a:endParaRPr>
-          </a:p>
-          <a:p>
-            <a:endParaRPr lang="en-GB" sz="2400" dirty="0" smtClean="0">
-              <a:latin typeface="Ubuntu Light" panose="020B0304030602030204" pitchFamily="34" charset="0"/>
-            </a:endParaRPr>
-          </a:p>
-          <a:p>
-            <a:endParaRPr lang="en-CA" sz="2400" baseline="0" noProof="0" dirty="0" smtClean="0">
-              <a:latin typeface="Ubuntu Light" panose="020B0304030602030204" pitchFamily="34" charset="0"/>
-            </a:endParaRPr>
-          </a:p>
-        </p:txBody>
-      </p:sp>
-      <p:pic>
-        <p:nvPicPr>
-          <p:cNvPr id="3074" name="Picture 2" descr="http://habrastorage.org/storage1/ca765613/d804afde/dba8310b/429fa832.png"/>
-          <p:cNvPicPr>
-            <a:picLocks noChangeAspect="1" noChangeArrowheads="1"/>
-          </p:cNvPicPr>
-          <p:nvPr/>
-        </p:nvPicPr>
-        <p:blipFill>
-          <a:blip r:embed="rId3">
-            <a:extLst>
-              <a:ext uri="{28A0092B-C50C-407E-A947-70E740481C1C}">
-                <a14:useLocalDpi xmlns:a14="http://schemas.microsoft.com/office/drawing/2010/main" val="0"/>
-              </a:ext>
-            </a:extLst>
-          </a:blip>
-          <a:srcRect/>
-          <a:stretch>
-            <a:fillRect/>
-          </a:stretch>
-        </p:blipFill>
-        <p:spPr bwMode="auto">
-          <a:xfrm>
-            <a:off x="3348037" y="1513737"/>
-            <a:ext cx="5495925" cy="942976"/>
-          </a:xfrm>
-          <a:prstGeom prst="rect">
-            <a:avLst/>
-          </a:prstGeom>
-          <a:noFill/>
-          <a:extLst>
-            <a:ext uri="{909E8E84-426E-40DD-AFC4-6F175D3DCCD1}">
-              <a14:hiddenFill xmlns:a14="http://schemas.microsoft.com/office/drawing/2010/main">
-                <a:solidFill>
-                  <a:srgbClr val="FFFFFF"/>
-                </a:solidFill>
-              </a14:hiddenFill>
-            </a:ext>
-          </a:extLst>
-        </p:spPr>
-      </p:pic>
-    </p:spTree>
-    <p:extLst>
-      <p:ext uri="{BB962C8B-B14F-4D97-AF65-F5344CB8AC3E}">
-        <p14:creationId xmlns:p14="http://schemas.microsoft.com/office/powerpoint/2010/main" val="1587402421"/>
-      </p:ext>
-    </p:extLst>
-  </p:cSld>
-  <p:clrMapOvr>
-    <a:masterClrMapping/>
-  </p:clrMapOvr>
-</p:sld>
-</file>
-
-<file path=ppt/slides/slide6.xml><?xml version="1.0" encoding="utf-8"?>
-<p:sld xmlns:a="http://schemas.openxmlformats.org/drawingml/2006/main" xmlns:r="http://schemas.openxmlformats.org/officeDocument/2006/relationships" xmlns:p="http://schemas.openxmlformats.org/presentationml/2006/main">
-  <p:cSld>
-    <p:spTree>
-      <p:nvGrpSpPr>
-        <p:cNvPr id="1" name=""/>
-        <p:cNvGrpSpPr/>
-        <p:nvPr/>
-      </p:nvGrpSpPr>
-      <p:grpSpPr>
-        <a:xfrm>
-          <a:off x="0" y="0"/>
-          <a:ext cx="0" cy="0"/>
-          <a:chOff x="0" y="0"/>
-          <a:chExt cx="0" cy="0"/>
-        </a:xfrm>
-      </p:grpSpPr>
-      <p:sp>
-        <p:nvSpPr>
-          <p:cNvPr id="2" name="Title 1"/>
-          <p:cNvSpPr>
-            <a:spLocks noGrp="1"/>
-          </p:cNvSpPr>
-          <p:nvPr>
-            <p:ph type="title"/>
-          </p:nvPr>
-        </p:nvSpPr>
-        <p:spPr>
-          <a:xfrm>
-            <a:off x="838200" y="365125"/>
-            <a:ext cx="10515600" cy="682137"/>
-          </a:xfrm>
-        </p:spPr>
-        <p:txBody>
-          <a:bodyPr>
-            <a:normAutofit fontScale="90000"/>
-          </a:bodyPr>
-          <a:lstStyle/>
-          <a:p>
-            <a:r>
-              <a:rPr lang="en-CA" dirty="0" smtClean="0">
-                <a:latin typeface="Ubuntu Condensed" panose="020B0506030602030204" pitchFamily="34" charset="0"/>
-              </a:rPr>
-              <a:t>What is Knockout.js</a:t>
-            </a:r>
-            <a:endParaRPr lang="en-CA" dirty="0">
-              <a:latin typeface="Ubuntu Condensed" panose="020B0506030602030204" pitchFamily="34" charset="0"/>
-            </a:endParaRPr>
-          </a:p>
-        </p:txBody>
-      </p:sp>
-      <p:sp>
-        <p:nvSpPr>
-          <p:cNvPr id="5" name="Content Placeholder 2"/>
-          <p:cNvSpPr txBox="1">
-            <a:spLocks/>
-          </p:cNvSpPr>
-          <p:nvPr/>
-        </p:nvSpPr>
-        <p:spPr>
-          <a:xfrm>
-            <a:off x="838200" y="2501769"/>
-            <a:ext cx="10515600" cy="2038426"/>
+            <a:off x="838200" y="2292568"/>
+            <a:ext cx="10515600" cy="1575239"/>
           </a:xfrm>
           <a:prstGeom prst="rect">
             <a:avLst/>
@@ -5387,54 +4734,76 @@
           </a:lstStyle>
           <a:p>
             <a:r>
-              <a:rPr lang="en-GB" sz="2400" dirty="0" smtClean="0">
+              <a:rPr lang="en-US" sz="2400" dirty="0" smtClean="0">
                 <a:latin typeface="Ubuntu Light" panose="020B0304030602030204" pitchFamily="34" charset="0"/>
+                <a:hlinkClick r:id="rId3"/>
               </a:rPr>
-              <a:t>Implements MVVM pattern</a:t>
-            </a:r>
-          </a:p>
-          <a:p>
-            <a:r>
-              <a:rPr lang="en-CA" sz="2400" dirty="0" smtClean="0">
+              <a:t>Writing </a:t>
+            </a:r>
+            <a:r>
+              <a:rPr lang="en-US" sz="2400" dirty="0">
                 <a:latin typeface="Ubuntu Light" panose="020B0304030602030204" pitchFamily="34" charset="0"/>
+                <a:hlinkClick r:id="rId3"/>
               </a:rPr>
-              <a:t>Uses transparent binding mechanism to offer interaction between DOM elements and </a:t>
-            </a:r>
-            <a:r>
-              <a:rPr lang="en-CA" sz="2400" dirty="0" err="1" smtClean="0">
+              <a:t>Modular JavaScript With AMD, </a:t>
+            </a:r>
+            <a:r>
+              <a:rPr lang="en-US" sz="2400" dirty="0" err="1">
                 <a:latin typeface="Ubuntu Light" panose="020B0304030602030204" pitchFamily="34" charset="0"/>
+                <a:hlinkClick r:id="rId3"/>
               </a:rPr>
-              <a:t>ViewModels</a:t>
-            </a:r>
-            <a:endParaRPr lang="en-CA" sz="2400" dirty="0" smtClean="0">
+              <a:t>CommonJS</a:t>
+            </a:r>
+            <a:r>
+              <a:rPr lang="en-US" sz="2400" dirty="0">
+                <a:latin typeface="Ubuntu Light" panose="020B0304030602030204" pitchFamily="34" charset="0"/>
+                <a:hlinkClick r:id="rId3"/>
+              </a:rPr>
+              <a:t> &amp; ES </a:t>
+            </a:r>
+            <a:r>
+              <a:rPr lang="en-US" sz="2400" dirty="0" smtClean="0">
+                <a:latin typeface="Ubuntu Light" panose="020B0304030602030204" pitchFamily="34" charset="0"/>
+                <a:hlinkClick r:id="rId3"/>
+              </a:rPr>
+              <a:t>Harmony</a:t>
+            </a:r>
+            <a:endParaRPr lang="en-US" sz="2400" dirty="0" smtClean="0">
               <a:latin typeface="Ubuntu Light" panose="020B0304030602030204" pitchFamily="34" charset="0"/>
             </a:endParaRPr>
           </a:p>
           <a:p>
             <a:r>
-              <a:rPr lang="en-CA" sz="2400" noProof="0" dirty="0" smtClean="0">
+              <a:rPr lang="fr-FR" sz="2400" dirty="0" smtClean="0">
                 <a:latin typeface="Ubuntu Light" panose="020B0304030602030204" pitchFamily="34" charset="0"/>
+                <a:hlinkClick r:id="rId4"/>
               </a:rPr>
-              <a:t>Uses HTML5 data attributes to realize </a:t>
-            </a:r>
-            <a:r>
-              <a:rPr lang="en-CA" sz="2400" noProof="0" dirty="0" err="1" smtClean="0">
+              <a:t>Official Require.js site</a:t>
+            </a:r>
+            <a:endParaRPr lang="en-US" sz="2400" dirty="0" smtClean="0">
+              <a:latin typeface="Ubuntu Light" panose="020B0304030602030204" pitchFamily="34" charset="0"/>
+            </a:endParaRPr>
+          </a:p>
+          <a:p>
+            <a:r>
+              <a:rPr lang="fr-FR" sz="2400" dirty="0" smtClean="0">
                 <a:latin typeface="Ubuntu Light" panose="020B0304030602030204" pitchFamily="34" charset="0"/>
+                <a:hlinkClick r:id="rId5"/>
               </a:rPr>
-              <a:t>intereaction</a:t>
-            </a:r>
-            <a:r>
-              <a:rPr lang="en-CA" sz="2400" noProof="0" dirty="0" smtClean="0">
+              <a:t>AMD </a:t>
+            </a:r>
+            <a:r>
+              <a:rPr lang="fr-FR" sz="2400" dirty="0" err="1" smtClean="0">
                 <a:latin typeface="Ubuntu Light" panose="020B0304030602030204" pitchFamily="34" charset="0"/>
+                <a:hlinkClick r:id="rId5"/>
               </a:rPr>
-              <a:t> View-</a:t>
-            </a:r>
-            <a:r>
-              <a:rPr lang="en-CA" sz="2400" noProof="0" dirty="0" err="1" smtClean="0">
-                <a:latin typeface="Ubuntu Light" panose="020B0304030602030204" pitchFamily="34" charset="0"/>
-              </a:rPr>
-              <a:t>ViewModel</a:t>
-            </a:r>
+              <a:t>Specification</a:t>
+            </a:r>
+            <a:endParaRPr lang="fr-FR" sz="2400" dirty="0" smtClean="0">
+              <a:latin typeface="Ubuntu Light" panose="020B0304030602030204" pitchFamily="34" charset="0"/>
+            </a:endParaRPr>
+          </a:p>
+          <a:p>
             <a:endParaRPr lang="en-CA" sz="2400" noProof="0" dirty="0" smtClean="0">
               <a:latin typeface="Ubuntu Light" panose="020B0304030602030204" pitchFamily="34" charset="0"/>
             </a:endParaRPr>
@@ -5459,485 +4828,7 @@
     </p:spTree>
     <p:extLst>
       <p:ext uri="{BB962C8B-B14F-4D97-AF65-F5344CB8AC3E}">
-        <p14:creationId xmlns:p14="http://schemas.microsoft.com/office/powerpoint/2010/main" val="467821554"/>
-      </p:ext>
-    </p:extLst>
-  </p:cSld>
-  <p:clrMapOvr>
-    <a:masterClrMapping/>
-  </p:clrMapOvr>
-</p:sld>
-</file>
-
-<file path=ppt/slides/slide7.xml><?xml version="1.0" encoding="utf-8"?>
-<p:sld xmlns:a="http://schemas.openxmlformats.org/drawingml/2006/main" xmlns:r="http://schemas.openxmlformats.org/officeDocument/2006/relationships" xmlns:p="http://schemas.openxmlformats.org/presentationml/2006/main">
-  <p:cSld>
-    <p:spTree>
-      <p:nvGrpSpPr>
-        <p:cNvPr id="1" name=""/>
-        <p:cNvGrpSpPr/>
-        <p:nvPr/>
-      </p:nvGrpSpPr>
-      <p:grpSpPr>
-        <a:xfrm>
-          <a:off x="0" y="0"/>
-          <a:ext cx="0" cy="0"/>
-          <a:chOff x="0" y="0"/>
-          <a:chExt cx="0" cy="0"/>
-        </a:xfrm>
-      </p:grpSpPr>
-      <p:sp>
-        <p:nvSpPr>
-          <p:cNvPr id="2" name="Title 1"/>
-          <p:cNvSpPr>
-            <a:spLocks noGrp="1"/>
-          </p:cNvSpPr>
-          <p:nvPr>
-            <p:ph type="title"/>
-          </p:nvPr>
-        </p:nvSpPr>
-        <p:spPr>
-          <a:xfrm>
-            <a:off x="838200" y="365125"/>
-            <a:ext cx="10515600" cy="682137"/>
-          </a:xfrm>
-        </p:spPr>
-        <p:txBody>
-          <a:bodyPr>
-            <a:normAutofit fontScale="90000"/>
-          </a:bodyPr>
-          <a:lstStyle/>
-          <a:p>
-            <a:r>
-              <a:rPr lang="en-CA" dirty="0" smtClean="0">
-                <a:latin typeface="Ubuntu Condensed" panose="020B0506030602030204" pitchFamily="34" charset="0"/>
-              </a:rPr>
-              <a:t>Main concepts</a:t>
-            </a:r>
-            <a:endParaRPr lang="en-CA" dirty="0">
-              <a:latin typeface="Ubuntu Condensed" panose="020B0506030602030204" pitchFamily="34" charset="0"/>
-            </a:endParaRPr>
-          </a:p>
-        </p:txBody>
-      </p:sp>
-      <p:sp>
-        <p:nvSpPr>
-          <p:cNvPr id="5" name="Content Placeholder 2"/>
-          <p:cNvSpPr txBox="1">
-            <a:spLocks/>
-          </p:cNvSpPr>
-          <p:nvPr/>
-        </p:nvSpPr>
-        <p:spPr>
-          <a:xfrm>
-            <a:off x="838200" y="1463040"/>
-            <a:ext cx="10515600" cy="4699221"/>
-          </a:xfrm>
-          <a:prstGeom prst="rect">
-            <a:avLst/>
-          </a:prstGeom>
-        </p:spPr>
-        <p:txBody>
-          <a:bodyPr vert="horz" lIns="91440" tIns="45720" rIns="91440" bIns="45720" rtlCol="0">
-            <a:normAutofit/>
-          </a:bodyPr>
-          <a:lstStyle>
-            <a:lvl1pPr marL="228600" indent="-228600" algn="l" defTabSz="914400" rtl="0" eaLnBrk="1" latinLnBrk="0" hangingPunct="1">
-              <a:lnSpc>
-                <a:spcPct val="90000"/>
-              </a:lnSpc>
-              <a:spcBef>
-                <a:spcPts val="1000"/>
-              </a:spcBef>
-              <a:buFont typeface="Arial" panose="020B0604020202020204" pitchFamily="34" charset="0"/>
-              <a:buChar char="•"/>
-              <a:defRPr sz="2800" kern="1200">
-                <a:solidFill>
-                  <a:schemeClr val="tx1"/>
-                </a:solidFill>
-                <a:latin typeface="+mn-lt"/>
-                <a:ea typeface="+mn-ea"/>
-                <a:cs typeface="+mn-cs"/>
-              </a:defRPr>
-            </a:lvl1pPr>
-            <a:lvl2pPr marL="685800" indent="-228600" algn="l" defTabSz="914400" rtl="0" eaLnBrk="1" latinLnBrk="0" hangingPunct="1">
-              <a:lnSpc>
-                <a:spcPct val="90000"/>
-              </a:lnSpc>
-              <a:spcBef>
-                <a:spcPts val="500"/>
-              </a:spcBef>
-              <a:buFont typeface="Arial" panose="020B0604020202020204" pitchFamily="34" charset="0"/>
-              <a:buChar char="•"/>
-              <a:defRPr sz="2400" kern="1200">
-                <a:solidFill>
-                  <a:schemeClr val="tx1"/>
-                </a:solidFill>
-                <a:latin typeface="+mn-lt"/>
-                <a:ea typeface="+mn-ea"/>
-                <a:cs typeface="+mn-cs"/>
-              </a:defRPr>
-            </a:lvl2pPr>
-            <a:lvl3pPr marL="1143000" indent="-228600" algn="l" defTabSz="914400" rtl="0" eaLnBrk="1" latinLnBrk="0" hangingPunct="1">
-              <a:lnSpc>
-                <a:spcPct val="90000"/>
-              </a:lnSpc>
-              <a:spcBef>
-                <a:spcPts val="500"/>
-              </a:spcBef>
-              <a:buFont typeface="Arial" panose="020B0604020202020204" pitchFamily="34" charset="0"/>
-              <a:buChar char="•"/>
-              <a:defRPr sz="2000" kern="1200">
-                <a:solidFill>
-                  <a:schemeClr val="tx1"/>
-                </a:solidFill>
-                <a:latin typeface="+mn-lt"/>
-                <a:ea typeface="+mn-ea"/>
-                <a:cs typeface="+mn-cs"/>
-              </a:defRPr>
-            </a:lvl3pPr>
-            <a:lvl4pPr marL="1600200" indent="-228600" algn="l" defTabSz="914400" rtl="0" eaLnBrk="1" latinLnBrk="0" hangingPunct="1">
-              <a:lnSpc>
-                <a:spcPct val="90000"/>
-              </a:lnSpc>
-              <a:spcBef>
-                <a:spcPts val="500"/>
-              </a:spcBef>
-              <a:buFont typeface="Arial" panose="020B0604020202020204" pitchFamily="34" charset="0"/>
-              <a:buChar char="•"/>
-              <a:defRPr sz="1800" kern="1200">
-                <a:solidFill>
-                  <a:schemeClr val="tx1"/>
-                </a:solidFill>
-                <a:latin typeface="+mn-lt"/>
-                <a:ea typeface="+mn-ea"/>
-                <a:cs typeface="+mn-cs"/>
-              </a:defRPr>
-            </a:lvl4pPr>
-            <a:lvl5pPr marL="2057400" indent="-228600" algn="l" defTabSz="914400" rtl="0" eaLnBrk="1" latinLnBrk="0" hangingPunct="1">
-              <a:lnSpc>
-                <a:spcPct val="90000"/>
-              </a:lnSpc>
-              <a:spcBef>
-                <a:spcPts val="500"/>
-              </a:spcBef>
-              <a:buFont typeface="Arial" panose="020B0604020202020204" pitchFamily="34" charset="0"/>
-              <a:buChar char="•"/>
-              <a:defRPr sz="1800" kern="1200">
-                <a:solidFill>
-                  <a:schemeClr val="tx1"/>
-                </a:solidFill>
-                <a:latin typeface="+mn-lt"/>
-                <a:ea typeface="+mn-ea"/>
-                <a:cs typeface="+mn-cs"/>
-              </a:defRPr>
-            </a:lvl5pPr>
-            <a:lvl6pPr marL="2514600" indent="-228600" algn="l" defTabSz="914400" rtl="0" eaLnBrk="1" latinLnBrk="0" hangingPunct="1">
-              <a:lnSpc>
-                <a:spcPct val="90000"/>
-              </a:lnSpc>
-              <a:spcBef>
-                <a:spcPts val="500"/>
-              </a:spcBef>
-              <a:buFont typeface="Arial" panose="020B0604020202020204" pitchFamily="34" charset="0"/>
-              <a:buChar char="•"/>
-              <a:defRPr sz="1800" kern="1200">
-                <a:solidFill>
-                  <a:schemeClr val="tx1"/>
-                </a:solidFill>
-                <a:latin typeface="+mn-lt"/>
-                <a:ea typeface="+mn-ea"/>
-                <a:cs typeface="+mn-cs"/>
-              </a:defRPr>
-            </a:lvl6pPr>
-            <a:lvl7pPr marL="2971800" indent="-228600" algn="l" defTabSz="914400" rtl="0" eaLnBrk="1" latinLnBrk="0" hangingPunct="1">
-              <a:lnSpc>
-                <a:spcPct val="90000"/>
-              </a:lnSpc>
-              <a:spcBef>
-                <a:spcPts val="500"/>
-              </a:spcBef>
-              <a:buFont typeface="Arial" panose="020B0604020202020204" pitchFamily="34" charset="0"/>
-              <a:buChar char="•"/>
-              <a:defRPr sz="1800" kern="1200">
-                <a:solidFill>
-                  <a:schemeClr val="tx1"/>
-                </a:solidFill>
-                <a:latin typeface="+mn-lt"/>
-                <a:ea typeface="+mn-ea"/>
-                <a:cs typeface="+mn-cs"/>
-              </a:defRPr>
-            </a:lvl7pPr>
-            <a:lvl8pPr marL="3429000" indent="-228600" algn="l" defTabSz="914400" rtl="0" eaLnBrk="1" latinLnBrk="0" hangingPunct="1">
-              <a:lnSpc>
-                <a:spcPct val="90000"/>
-              </a:lnSpc>
-              <a:spcBef>
-                <a:spcPts val="500"/>
-              </a:spcBef>
-              <a:buFont typeface="Arial" panose="020B0604020202020204" pitchFamily="34" charset="0"/>
-              <a:buChar char="•"/>
-              <a:defRPr sz="1800" kern="1200">
-                <a:solidFill>
-                  <a:schemeClr val="tx1"/>
-                </a:solidFill>
-                <a:latin typeface="+mn-lt"/>
-                <a:ea typeface="+mn-ea"/>
-                <a:cs typeface="+mn-cs"/>
-              </a:defRPr>
-            </a:lvl8pPr>
-            <a:lvl9pPr marL="3886200" indent="-228600" algn="l" defTabSz="914400" rtl="0" eaLnBrk="1" latinLnBrk="0" hangingPunct="1">
-              <a:lnSpc>
-                <a:spcPct val="90000"/>
-              </a:lnSpc>
-              <a:spcBef>
-                <a:spcPts val="500"/>
-              </a:spcBef>
-              <a:buFont typeface="Arial" panose="020B0604020202020204" pitchFamily="34" charset="0"/>
-              <a:buChar char="•"/>
-              <a:defRPr sz="1800" kern="1200">
-                <a:solidFill>
-                  <a:schemeClr val="tx1"/>
-                </a:solidFill>
-                <a:latin typeface="+mn-lt"/>
-                <a:ea typeface="+mn-ea"/>
-                <a:cs typeface="+mn-cs"/>
-              </a:defRPr>
-            </a:lvl9pPr>
-          </a:lstStyle>
-          <a:p>
-            <a:pPr marL="0" indent="0">
-              <a:buNone/>
-            </a:pPr>
-            <a:r>
-              <a:rPr lang="en-GB" sz="2400" dirty="0" smtClean="0">
-                <a:latin typeface="Ubuntu Light" panose="020B0304030602030204" pitchFamily="34" charset="0"/>
-              </a:rPr>
-              <a:t>View</a:t>
-            </a:r>
-            <a:r>
-              <a:rPr lang="en-GB" sz="2000" dirty="0" smtClean="0">
-                <a:latin typeface="Ubuntu Light" panose="020B0304030602030204" pitchFamily="34" charset="0"/>
-              </a:rPr>
-              <a:t>:</a:t>
-            </a:r>
-          </a:p>
-          <a:p>
-            <a:pPr marL="0" indent="0">
-              <a:buNone/>
-            </a:pPr>
-            <a:r>
-              <a:rPr lang="en-US" sz="2000" dirty="0" smtClean="0">
-                <a:latin typeface="Ubuntu Mono" panose="020B0509030602030204" pitchFamily="49" charset="0"/>
-              </a:rPr>
-              <a:t>&lt;</a:t>
-            </a:r>
-            <a:r>
-              <a:rPr lang="en-US" sz="2000" dirty="0">
-                <a:latin typeface="Ubuntu Mono" panose="020B0509030602030204" pitchFamily="49" charset="0"/>
-              </a:rPr>
-              <a:t>div id=”</a:t>
-            </a:r>
-            <a:r>
-              <a:rPr lang="en-US" sz="2000" dirty="0" err="1">
-                <a:latin typeface="Ubuntu Mono" panose="020B0509030602030204" pitchFamily="49" charset="0"/>
-              </a:rPr>
-              <a:t>customerDetails</a:t>
-            </a:r>
-            <a:r>
-              <a:rPr lang="en-US" sz="2000" dirty="0">
-                <a:latin typeface="Ubuntu Mono" panose="020B0509030602030204" pitchFamily="49" charset="0"/>
-              </a:rPr>
-              <a:t>” </a:t>
-            </a:r>
-            <a:endParaRPr lang="en-US" sz="2000" dirty="0" smtClean="0">
-              <a:latin typeface="Ubuntu Mono" panose="020B0509030602030204" pitchFamily="49" charset="0"/>
-            </a:endParaRPr>
-          </a:p>
-          <a:p>
-            <a:pPr marL="0" indent="0">
-              <a:buNone/>
-            </a:pPr>
-            <a:r>
-              <a:rPr lang="en-US" sz="2000" dirty="0" smtClean="0">
-                <a:latin typeface="Ubuntu Mono" panose="020B0509030602030204" pitchFamily="49" charset="0"/>
-              </a:rPr>
-              <a:t>     data-bind</a:t>
-            </a:r>
-            <a:r>
-              <a:rPr lang="en-US" sz="2000" dirty="0">
-                <a:latin typeface="Ubuntu Mono" panose="020B0509030602030204" pitchFamily="49" charset="0"/>
-              </a:rPr>
-              <a:t>=”visible: </a:t>
-            </a:r>
-            <a:r>
-              <a:rPr lang="en-US" sz="2000" dirty="0" err="1">
-                <a:latin typeface="Ubuntu Mono" panose="020B0509030602030204" pitchFamily="49" charset="0"/>
-              </a:rPr>
-              <a:t>currentCustomer</a:t>
-            </a:r>
-            <a:r>
-              <a:rPr lang="en-US" sz="2000" dirty="0">
-                <a:latin typeface="Ubuntu Mono" panose="020B0509030602030204" pitchFamily="49" charset="0"/>
-              </a:rPr>
-              <a:t>() !== null</a:t>
-            </a:r>
-            <a:r>
-              <a:rPr lang="en-US" sz="2000" dirty="0" smtClean="0">
-                <a:latin typeface="Ubuntu Mono" panose="020B0509030602030204" pitchFamily="49" charset="0"/>
-              </a:rPr>
-              <a:t>”&gt;</a:t>
-            </a:r>
-          </a:p>
-          <a:p>
-            <a:pPr marL="0" indent="0">
-              <a:buNone/>
-            </a:pPr>
-            <a:endParaRPr lang="en-GB" sz="2400" dirty="0" smtClean="0">
-              <a:latin typeface="Ubuntu Light" panose="020B0304030602030204" pitchFamily="34" charset="0"/>
-            </a:endParaRPr>
-          </a:p>
-          <a:p>
-            <a:pPr marL="0" indent="0">
-              <a:buNone/>
-            </a:pPr>
-            <a:r>
-              <a:rPr lang="en-GB" sz="2400" dirty="0" err="1" smtClean="0">
-                <a:latin typeface="Ubuntu Light" panose="020B0304030602030204" pitchFamily="34" charset="0"/>
-              </a:rPr>
-              <a:t>ViewModel</a:t>
-            </a:r>
-            <a:r>
-              <a:rPr lang="en-GB" sz="2400" dirty="0" smtClean="0">
-                <a:latin typeface="Ubuntu Light" panose="020B0304030602030204" pitchFamily="34" charset="0"/>
-              </a:rPr>
-              <a:t>:</a:t>
-            </a:r>
-          </a:p>
-          <a:p>
-            <a:pPr marL="0" indent="0">
-              <a:buNone/>
-            </a:pPr>
-            <a:r>
-              <a:rPr lang="fr-FR" sz="2000" dirty="0">
-                <a:latin typeface="Ubuntu Mono" panose="020B0509030602030204" pitchFamily="49" charset="0"/>
-              </a:rPr>
-              <a:t>var </a:t>
-            </a:r>
-            <a:r>
-              <a:rPr lang="fr-FR" sz="2000" dirty="0" err="1">
-                <a:latin typeface="Ubuntu Mono" panose="020B0509030602030204" pitchFamily="49" charset="0"/>
-              </a:rPr>
-              <a:t>vewModel</a:t>
-            </a:r>
-            <a:r>
-              <a:rPr lang="fr-FR" sz="2000" dirty="0">
-                <a:latin typeface="Ubuntu Mono" panose="020B0509030602030204" pitchFamily="49" charset="0"/>
-              </a:rPr>
-              <a:t> = {</a:t>
-            </a:r>
-            <a:r>
-              <a:rPr lang="fr-FR" sz="2000" dirty="0" smtClean="0">
-                <a:latin typeface="Ubuntu Mono" panose="020B0509030602030204" pitchFamily="49" charset="0"/>
-              </a:rPr>
-              <a:t/>
-            </a:r>
-            <a:br>
-              <a:rPr lang="fr-FR" sz="2000" dirty="0" smtClean="0">
-                <a:latin typeface="Ubuntu Mono" panose="020B0509030602030204" pitchFamily="49" charset="0"/>
-              </a:rPr>
-            </a:br>
-            <a:r>
-              <a:rPr lang="fr-FR" sz="2000" dirty="0">
-                <a:latin typeface="Ubuntu Mono" panose="020B0509030602030204" pitchFamily="49" charset="0"/>
-              </a:rPr>
-              <a:t>  </a:t>
-            </a:r>
-            <a:r>
-              <a:rPr lang="fr-FR" sz="2000" dirty="0" err="1">
-                <a:latin typeface="Ubuntu Mono" panose="020B0509030602030204" pitchFamily="49" charset="0"/>
-              </a:rPr>
-              <a:t>currentCustomer</a:t>
-            </a:r>
-            <a:r>
-              <a:rPr lang="fr-FR" sz="2000" dirty="0">
-                <a:latin typeface="Ubuntu Mono" panose="020B0509030602030204" pitchFamily="49" charset="0"/>
-              </a:rPr>
-              <a:t>: </a:t>
-            </a:r>
-            <a:r>
-              <a:rPr lang="fr-FR" sz="2000" dirty="0" err="1">
-                <a:latin typeface="Ubuntu Mono" panose="020B0509030602030204" pitchFamily="49" charset="0"/>
-              </a:rPr>
-              <a:t>ko.observable</a:t>
-            </a:r>
-            <a:r>
-              <a:rPr lang="fr-FR" sz="2000" dirty="0">
-                <a:latin typeface="Ubuntu Mono" panose="020B0509030602030204" pitchFamily="49" charset="0"/>
-              </a:rPr>
-              <a:t>(</a:t>
-            </a:r>
-            <a:r>
-              <a:rPr lang="fr-FR" sz="2000" dirty="0" err="1">
-                <a:latin typeface="Ubuntu Mono" panose="020B0509030602030204" pitchFamily="49" charset="0"/>
-              </a:rPr>
-              <a:t>defaultCustomer</a:t>
-            </a:r>
-            <a:r>
-              <a:rPr lang="fr-FR" sz="2000" dirty="0" smtClean="0">
-                <a:latin typeface="Ubuntu Mono" panose="020B0509030602030204" pitchFamily="49" charset="0"/>
-              </a:rPr>
-              <a:t>)</a:t>
-            </a:r>
-            <a:br>
-              <a:rPr lang="fr-FR" sz="2000" dirty="0" smtClean="0">
-                <a:latin typeface="Ubuntu Mono" panose="020B0509030602030204" pitchFamily="49" charset="0"/>
-              </a:rPr>
-            </a:br>
-            <a:r>
-              <a:rPr lang="fr-FR" sz="2000" dirty="0">
-                <a:latin typeface="Ubuntu Mono" panose="020B0509030602030204" pitchFamily="49" charset="0"/>
-              </a:rPr>
-              <a:t>}</a:t>
-            </a:r>
-            <a:endParaRPr lang="en-GB" sz="2000" dirty="0" smtClean="0">
-              <a:latin typeface="Ubuntu Mono" panose="020B0509030602030204" pitchFamily="49" charset="0"/>
-            </a:endParaRPr>
-          </a:p>
-          <a:p>
-            <a:pPr marL="0" indent="0">
-              <a:buNone/>
-            </a:pPr>
-            <a:endParaRPr lang="en-CA" sz="2400" baseline="0" noProof="0" dirty="0" smtClean="0">
-              <a:latin typeface="Ubuntu Light" panose="020B0304030602030204" pitchFamily="34" charset="0"/>
-            </a:endParaRPr>
-          </a:p>
-          <a:p>
-            <a:pPr marL="0" indent="0">
-              <a:buNone/>
-            </a:pPr>
-            <a:r>
-              <a:rPr lang="en-CA" sz="2400" dirty="0" smtClean="0">
-                <a:latin typeface="Ubuntu Light" panose="020B0304030602030204" pitchFamily="34" charset="0"/>
-              </a:rPr>
-              <a:t>Customer details will become visible only if current customer value will be assign to the </a:t>
-            </a:r>
-            <a:r>
-              <a:rPr lang="en-CA" sz="2400" smtClean="0">
-                <a:latin typeface="Ubuntu Light" panose="020B0304030602030204" pitchFamily="34" charset="0"/>
-              </a:rPr>
-              <a:t>view model field</a:t>
-            </a:r>
-            <a:endParaRPr lang="en-CA" sz="2400" baseline="0" noProof="0" dirty="0" smtClean="0">
-              <a:latin typeface="Ubuntu Light" panose="020B0304030602030204" pitchFamily="34" charset="0"/>
-            </a:endParaRPr>
-          </a:p>
-        </p:txBody>
-      </p:sp>
-    </p:spTree>
-    <p:extLst>
-      <p:ext uri="{BB962C8B-B14F-4D97-AF65-F5344CB8AC3E}">
-        <p14:creationId xmlns:p14="http://schemas.microsoft.com/office/powerpoint/2010/main" val="4220660730"/>
+        <p14:creationId xmlns:p14="http://schemas.microsoft.com/office/powerpoint/2010/main" val="1587402421"/>
       </p:ext>
     </p:extLst>
   </p:cSld>

</xml_diff>

<commit_message>
[Require.js] Fix some corners
</commit_message>
<xml_diff>
--- a/require.js/require.js.pptx
+++ b/require.js/require.js.pptx
@@ -214,7 +214,7 @@
           <a:p>
             <a:fld id="{C5154B15-60D3-4535-B029-4D100D89B8DD}" type="datetimeFigureOut">
               <a:rPr lang="fr-FR" smtClean="0"/>
-              <a:t>21/10/2013</a:t>
+              <a:t>28/10/2013</a:t>
             </a:fld>
             <a:endParaRPr lang="fr-FR"/>
           </a:p>
@@ -789,7 +789,7 @@
           <a:p>
             <a:fld id="{9B0E7100-CB1C-4906-903B-B0AA84BE9C13}" type="datetimeFigureOut">
               <a:rPr lang="fr-FR" smtClean="0"/>
-              <a:t>21/10/2013</a:t>
+              <a:t>28/10/2013</a:t>
             </a:fld>
             <a:endParaRPr lang="fr-FR"/>
           </a:p>
@@ -959,7 +959,7 @@
           <a:p>
             <a:fld id="{9B0E7100-CB1C-4906-903B-B0AA84BE9C13}" type="datetimeFigureOut">
               <a:rPr lang="fr-FR" smtClean="0"/>
-              <a:t>21/10/2013</a:t>
+              <a:t>28/10/2013</a:t>
             </a:fld>
             <a:endParaRPr lang="fr-FR"/>
           </a:p>
@@ -1139,7 +1139,7 @@
           <a:p>
             <a:fld id="{9B0E7100-CB1C-4906-903B-B0AA84BE9C13}" type="datetimeFigureOut">
               <a:rPr lang="fr-FR" smtClean="0"/>
-              <a:t>21/10/2013</a:t>
+              <a:t>28/10/2013</a:t>
             </a:fld>
             <a:endParaRPr lang="fr-FR"/>
           </a:p>
@@ -1309,7 +1309,7 @@
           <a:p>
             <a:fld id="{9B0E7100-CB1C-4906-903B-B0AA84BE9C13}" type="datetimeFigureOut">
               <a:rPr lang="fr-FR" smtClean="0"/>
-              <a:t>21/10/2013</a:t>
+              <a:t>28/10/2013</a:t>
             </a:fld>
             <a:endParaRPr lang="fr-FR"/>
           </a:p>
@@ -1555,7 +1555,7 @@
           <a:p>
             <a:fld id="{9B0E7100-CB1C-4906-903B-B0AA84BE9C13}" type="datetimeFigureOut">
               <a:rPr lang="fr-FR" smtClean="0"/>
-              <a:t>21/10/2013</a:t>
+              <a:t>28/10/2013</a:t>
             </a:fld>
             <a:endParaRPr lang="fr-FR"/>
           </a:p>
@@ -1787,7 +1787,7 @@
           <a:p>
             <a:fld id="{9B0E7100-CB1C-4906-903B-B0AA84BE9C13}" type="datetimeFigureOut">
               <a:rPr lang="fr-FR" smtClean="0"/>
-              <a:t>21/10/2013</a:t>
+              <a:t>28/10/2013</a:t>
             </a:fld>
             <a:endParaRPr lang="fr-FR"/>
           </a:p>
@@ -2154,7 +2154,7 @@
           <a:p>
             <a:fld id="{9B0E7100-CB1C-4906-903B-B0AA84BE9C13}" type="datetimeFigureOut">
               <a:rPr lang="fr-FR" smtClean="0"/>
-              <a:t>21/10/2013</a:t>
+              <a:t>28/10/2013</a:t>
             </a:fld>
             <a:endParaRPr lang="fr-FR"/>
           </a:p>
@@ -2272,7 +2272,7 @@
           <a:p>
             <a:fld id="{9B0E7100-CB1C-4906-903B-B0AA84BE9C13}" type="datetimeFigureOut">
               <a:rPr lang="fr-FR" smtClean="0"/>
-              <a:t>21/10/2013</a:t>
+              <a:t>28/10/2013</a:t>
             </a:fld>
             <a:endParaRPr lang="fr-FR"/>
           </a:p>
@@ -2367,7 +2367,7 @@
           <a:p>
             <a:fld id="{9B0E7100-CB1C-4906-903B-B0AA84BE9C13}" type="datetimeFigureOut">
               <a:rPr lang="fr-FR" smtClean="0"/>
-              <a:t>21/10/2013</a:t>
+              <a:t>28/10/2013</a:t>
             </a:fld>
             <a:endParaRPr lang="fr-FR"/>
           </a:p>
@@ -2644,7 +2644,7 @@
           <a:p>
             <a:fld id="{9B0E7100-CB1C-4906-903B-B0AA84BE9C13}" type="datetimeFigureOut">
               <a:rPr lang="fr-FR" smtClean="0"/>
-              <a:t>21/10/2013</a:t>
+              <a:t>28/10/2013</a:t>
             </a:fld>
             <a:endParaRPr lang="fr-FR"/>
           </a:p>
@@ -2897,7 +2897,7 @@
           <a:p>
             <a:fld id="{9B0E7100-CB1C-4906-903B-B0AA84BE9C13}" type="datetimeFigureOut">
               <a:rPr lang="fr-FR" smtClean="0"/>
-              <a:t>21/10/2013</a:t>
+              <a:t>28/10/2013</a:t>
             </a:fld>
             <a:endParaRPr lang="fr-FR"/>
           </a:p>
@@ -3110,7 +3110,7 @@
           <a:p>
             <a:fld id="{9B0E7100-CB1C-4906-903B-B0AA84BE9C13}" type="datetimeFigureOut">
               <a:rPr lang="fr-FR" smtClean="0"/>
-              <a:t>21/10/2013</a:t>
+              <a:t>28/10/2013</a:t>
             </a:fld>
             <a:endParaRPr lang="fr-FR"/>
           </a:p>
@@ -3591,6 +3591,13 @@
   <p:clrMapOvr>
     <a:masterClrMapping/>
   </p:clrMapOvr>
+  <p:timing>
+    <p:tnLst>
+      <p:par>
+        <p:cTn id="1" dur="indefinite" restart="never" nodeType="tmRoot"/>
+      </p:par>
+    </p:tnLst>
+  </p:timing>
 </p:sld>
 </file>
 
@@ -3721,6 +3728,13 @@
   <p:clrMapOvr>
     <a:masterClrMapping/>
   </p:clrMapOvr>
+  <p:timing>
+    <p:tnLst>
+      <p:par>
+        <p:cTn id="1" dur="indefinite" restart="never" nodeType="tmRoot"/>
+      </p:par>
+    </p:tnLst>
+  </p:timing>
 </p:sld>
 </file>
 
@@ -4007,9 +4021,6 @@
               </a:rPr>
               <a:t>Requires configuration</a:t>
             </a:r>
-            <a:endParaRPr lang="en-GB" sz="2400" dirty="0" smtClean="0">
-              <a:latin typeface="Ubuntu Light" panose="020B0304030602030204" pitchFamily="34" charset="0"/>
-            </a:endParaRPr>
           </a:p>
         </p:txBody>
       </p:sp>
@@ -4023,6 +4034,13 @@
   <p:clrMapOvr>
     <a:masterClrMapping/>
   </p:clrMapOvr>
+  <p:timing>
+    <p:tnLst>
+      <p:par>
+        <p:cTn id="1" dur="indefinite" restart="never" nodeType="tmRoot"/>
+      </p:par>
+    </p:tnLst>
+  </p:timing>
 </p:sld>
 </file>
 
@@ -4418,10 +4436,16 @@
               <a:t>function</a:t>
             </a:r>
             <a:r>
+              <a:rPr lang="fr-FR" sz="1800" smtClean="0">
+                <a:latin typeface="Ubuntu Mono" panose="020B0509030602030204" pitchFamily="49" charset="0"/>
+              </a:rPr>
+              <a:t>(mm, $) </a:t>
+            </a:r>
+            <a:r>
               <a:rPr lang="fr-FR" sz="1800" dirty="0" smtClean="0">
                 <a:latin typeface="Ubuntu Mono" panose="020B0509030602030204" pitchFamily="49" charset="0"/>
               </a:rPr>
-              <a:t>($) { /* Do </a:t>
+              <a:t>{ /* Do </a:t>
             </a:r>
             <a:r>
               <a:rPr lang="fr-FR" sz="1800" dirty="0" err="1" smtClean="0">
@@ -4493,6 +4517,13 @@
   <p:clrMapOvr>
     <a:masterClrMapping/>
   </p:clrMapOvr>
+  <p:timing>
+    <p:tnLst>
+      <p:par>
+        <p:cTn id="1" dur="indefinite" restart="never" nodeType="tmRoot"/>
+      </p:par>
+    </p:tnLst>
+  </p:timing>
 </p:sld>
 </file>
 

</xml_diff>